<commit_message>
UI improvements and code cleanup
</commit_message>
<xml_diff>
--- a/docs/ミーティング/発表資料/25_0725_進捗.pptx
+++ b/docs/ミーティング/発表資料/25_0725_進捗.pptx
@@ -5,7 +5,7 @@
     <p:sldMasterId id="2147483648" r:id="rId1"/>
   </p:sldMasterIdLst>
   <p:notesMasterIdLst>
-    <p:notesMasterId r:id="rId10"/>
+    <p:notesMasterId r:id="rId7"/>
   </p:notesMasterIdLst>
   <p:sldIdLst>
     <p:sldId id="256" r:id="rId2"/>
@@ -13,26 +13,23 @@
     <p:sldId id="302" r:id="rId4"/>
     <p:sldId id="304" r:id="rId5"/>
     <p:sldId id="305" r:id="rId6"/>
-    <p:sldId id="306" r:id="rId7"/>
-    <p:sldId id="307" r:id="rId8"/>
-    <p:sldId id="308" r:id="rId9"/>
   </p:sldIdLst>
   <p:sldSz cx="18288000" cy="10287000"/>
   <p:notesSz cx="6858000" cy="9144000"/>
   <p:embeddedFontLst>
     <p:embeddedFont>
-      <p:font typeface="游ゴシック" panose="020B0400000000000000" pitchFamily="34" charset="-128"/>
-      <p:regular r:id="rId11"/>
-      <p:bold r:id="rId12"/>
+      <p:font typeface="Cambria Math" panose="02040503050406030204" pitchFamily="18" charset="0"/>
+      <p:regular r:id="rId8"/>
     </p:embeddedFont>
     <p:embeddedFont>
       <p:font typeface="游ゴシック" panose="020B0400000000000000" pitchFamily="34" charset="-128"/>
-      <p:regular r:id="rId11"/>
-      <p:bold r:id="rId12"/>
+      <p:regular r:id="rId9"/>
+      <p:bold r:id="rId10"/>
     </p:embeddedFont>
     <p:embeddedFont>
-      <p:font typeface="Cambria Math" panose="02040503050406030204" pitchFamily="18" charset="0"/>
-      <p:regular r:id="rId13"/>
+      <p:font typeface="游ゴシック" panose="020B0400000000000000" pitchFamily="34" charset="-128"/>
+      <p:regular r:id="rId9"/>
+      <p:bold r:id="rId10"/>
     </p:embeddedFont>
   </p:embeddedFontLst>
   <p:defaultTextStyle>
@@ -231,7 +228,7 @@
           <a:p>
             <a:fld id="{5315D7B3-D8F9-DB42-9752-C640A49B89F2}" type="datetimeFigureOut">
               <a:rPr kumimoji="1" lang="ja-JP" altLang="en-US" smtClean="0"/>
-              <a:t>2025/7/22</a:t>
+              <a:t>2025/7/24</a:t>
             </a:fld>
             <a:endParaRPr kumimoji="1" lang="ja-JP" altLang="en-US"/>
           </a:p>
@@ -972,336 +969,6 @@
 </p:notes>
 </file>
 
-<file path=ppt/notesSlides/notesSlide5.xml><?xml version="1.0" encoding="utf-8"?>
-<p:notes xmlns:a="http://schemas.openxmlformats.org/drawingml/2006/main" xmlns:r="http://schemas.openxmlformats.org/officeDocument/2006/relationships" xmlns:p="http://schemas.openxmlformats.org/presentationml/2006/main">
-  <p:cSld>
-    <p:spTree>
-      <p:nvGrpSpPr>
-        <p:cNvPr id="1" name="">
-          <a:extLst>
-            <a:ext uri="{FF2B5EF4-FFF2-40B4-BE49-F238E27FC236}">
-              <a16:creationId xmlns:a16="http://schemas.microsoft.com/office/drawing/2014/main" id="{62DE9656-0CB5-5EFF-B5D4-0C5317A8FD19}"/>
-            </a:ext>
-          </a:extLst>
-        </p:cNvPr>
-        <p:cNvGrpSpPr/>
-        <p:nvPr/>
-      </p:nvGrpSpPr>
-      <p:grpSpPr>
-        <a:xfrm>
-          <a:off x="0" y="0"/>
-          <a:ext cx="0" cy="0"/>
-          <a:chOff x="0" y="0"/>
-          <a:chExt cx="0" cy="0"/>
-        </a:xfrm>
-      </p:grpSpPr>
-      <p:sp>
-        <p:nvSpPr>
-          <p:cNvPr id="2" name="スライド イメージ プレースホルダー 1">
-            <a:extLst>
-              <a:ext uri="{FF2B5EF4-FFF2-40B4-BE49-F238E27FC236}">
-                <a16:creationId xmlns:a16="http://schemas.microsoft.com/office/drawing/2014/main" id="{3F9E3708-409D-A420-6B36-895298A83225}"/>
-              </a:ext>
-            </a:extLst>
-          </p:cNvPr>
-          <p:cNvSpPr>
-            <a:spLocks noGrp="1" noRot="1" noChangeAspect="1"/>
-          </p:cNvSpPr>
-          <p:nvPr>
-            <p:ph type="sldImg"/>
-          </p:nvPr>
-        </p:nvSpPr>
-        <p:spPr/>
-      </p:sp>
-      <p:sp>
-        <p:nvSpPr>
-          <p:cNvPr id="3" name="ノート プレースホルダー 2">
-            <a:extLst>
-              <a:ext uri="{FF2B5EF4-FFF2-40B4-BE49-F238E27FC236}">
-                <a16:creationId xmlns:a16="http://schemas.microsoft.com/office/drawing/2014/main" id="{1A37DBF2-13AB-113E-39DA-6162FEA0414F}"/>
-              </a:ext>
-            </a:extLst>
-          </p:cNvPr>
-          <p:cNvSpPr>
-            <a:spLocks noGrp="1"/>
-          </p:cNvSpPr>
-          <p:nvPr>
-            <p:ph type="body" idx="1"/>
-          </p:nvPr>
-        </p:nvSpPr>
-        <p:spPr/>
-        <p:txBody>
-          <a:bodyPr/>
-          <a:lstStyle/>
-          <a:p>
-            <a:endParaRPr lang="ja-JP" altLang="en-US">
-              <a:effectLst/>
-            </a:endParaRPr>
-          </a:p>
-        </p:txBody>
-      </p:sp>
-      <p:sp>
-        <p:nvSpPr>
-          <p:cNvPr id="4" name="スライド番号プレースホルダー 3">
-            <a:extLst>
-              <a:ext uri="{FF2B5EF4-FFF2-40B4-BE49-F238E27FC236}">
-                <a16:creationId xmlns:a16="http://schemas.microsoft.com/office/drawing/2014/main" id="{56F7B8E7-3E84-144B-090E-038EA384E8F0}"/>
-              </a:ext>
-            </a:extLst>
-          </p:cNvPr>
-          <p:cNvSpPr>
-            <a:spLocks noGrp="1"/>
-          </p:cNvSpPr>
-          <p:nvPr>
-            <p:ph type="sldNum" sz="quarter" idx="5"/>
-          </p:nvPr>
-        </p:nvSpPr>
-        <p:spPr/>
-        <p:txBody>
-          <a:bodyPr/>
-          <a:lstStyle/>
-          <a:p>
-            <a:fld id="{423E85BE-9FAD-764D-B84A-7C70829A20A9}" type="slidenum">
-              <a:rPr kumimoji="1" lang="ja-JP" altLang="en-US" smtClean="0"/>
-              <a:t>6</a:t>
-            </a:fld>
-            <a:endParaRPr kumimoji="1" lang="ja-JP" altLang="en-US"/>
-          </a:p>
-        </p:txBody>
-      </p:sp>
-    </p:spTree>
-    <p:extLst>
-      <p:ext uri="{BB962C8B-B14F-4D97-AF65-F5344CB8AC3E}">
-        <p14:creationId xmlns:p14="http://schemas.microsoft.com/office/powerpoint/2010/main" val="1991656455"/>
-      </p:ext>
-    </p:extLst>
-  </p:cSld>
-  <p:clrMapOvr>
-    <a:masterClrMapping/>
-  </p:clrMapOvr>
-</p:notes>
-</file>
-
-<file path=ppt/notesSlides/notesSlide6.xml><?xml version="1.0" encoding="utf-8"?>
-<p:notes xmlns:a="http://schemas.openxmlformats.org/drawingml/2006/main" xmlns:r="http://schemas.openxmlformats.org/officeDocument/2006/relationships" xmlns:p="http://schemas.openxmlformats.org/presentationml/2006/main">
-  <p:cSld>
-    <p:spTree>
-      <p:nvGrpSpPr>
-        <p:cNvPr id="1" name="">
-          <a:extLst>
-            <a:ext uri="{FF2B5EF4-FFF2-40B4-BE49-F238E27FC236}">
-              <a16:creationId xmlns:a16="http://schemas.microsoft.com/office/drawing/2014/main" id="{62B5CCEC-99D1-7C0B-D336-5130014621AF}"/>
-            </a:ext>
-          </a:extLst>
-        </p:cNvPr>
-        <p:cNvGrpSpPr/>
-        <p:nvPr/>
-      </p:nvGrpSpPr>
-      <p:grpSpPr>
-        <a:xfrm>
-          <a:off x="0" y="0"/>
-          <a:ext cx="0" cy="0"/>
-          <a:chOff x="0" y="0"/>
-          <a:chExt cx="0" cy="0"/>
-        </a:xfrm>
-      </p:grpSpPr>
-      <p:sp>
-        <p:nvSpPr>
-          <p:cNvPr id="2" name="スライド イメージ プレースホルダー 1">
-            <a:extLst>
-              <a:ext uri="{FF2B5EF4-FFF2-40B4-BE49-F238E27FC236}">
-                <a16:creationId xmlns:a16="http://schemas.microsoft.com/office/drawing/2014/main" id="{F89B1F36-B6E7-7E18-D8BE-E4A073AD8CE5}"/>
-              </a:ext>
-            </a:extLst>
-          </p:cNvPr>
-          <p:cNvSpPr>
-            <a:spLocks noGrp="1" noRot="1" noChangeAspect="1"/>
-          </p:cNvSpPr>
-          <p:nvPr>
-            <p:ph type="sldImg"/>
-          </p:nvPr>
-        </p:nvSpPr>
-        <p:spPr/>
-      </p:sp>
-      <p:sp>
-        <p:nvSpPr>
-          <p:cNvPr id="3" name="ノート プレースホルダー 2">
-            <a:extLst>
-              <a:ext uri="{FF2B5EF4-FFF2-40B4-BE49-F238E27FC236}">
-                <a16:creationId xmlns:a16="http://schemas.microsoft.com/office/drawing/2014/main" id="{0469A689-1AA0-809F-286A-E6781BA39C64}"/>
-              </a:ext>
-            </a:extLst>
-          </p:cNvPr>
-          <p:cNvSpPr>
-            <a:spLocks noGrp="1"/>
-          </p:cNvSpPr>
-          <p:nvPr>
-            <p:ph type="body" idx="1"/>
-          </p:nvPr>
-        </p:nvSpPr>
-        <p:spPr/>
-        <p:txBody>
-          <a:bodyPr/>
-          <a:lstStyle/>
-          <a:p>
-            <a:endParaRPr lang="ja-JP" altLang="en-US">
-              <a:effectLst/>
-            </a:endParaRPr>
-          </a:p>
-        </p:txBody>
-      </p:sp>
-      <p:sp>
-        <p:nvSpPr>
-          <p:cNvPr id="4" name="スライド番号プレースホルダー 3">
-            <a:extLst>
-              <a:ext uri="{FF2B5EF4-FFF2-40B4-BE49-F238E27FC236}">
-                <a16:creationId xmlns:a16="http://schemas.microsoft.com/office/drawing/2014/main" id="{A257BD2A-ED47-46D9-1CC4-33A19CBF8F0D}"/>
-              </a:ext>
-            </a:extLst>
-          </p:cNvPr>
-          <p:cNvSpPr>
-            <a:spLocks noGrp="1"/>
-          </p:cNvSpPr>
-          <p:nvPr>
-            <p:ph type="sldNum" sz="quarter" idx="5"/>
-          </p:nvPr>
-        </p:nvSpPr>
-        <p:spPr/>
-        <p:txBody>
-          <a:bodyPr/>
-          <a:lstStyle/>
-          <a:p>
-            <a:fld id="{423E85BE-9FAD-764D-B84A-7C70829A20A9}" type="slidenum">
-              <a:rPr kumimoji="1" lang="ja-JP" altLang="en-US" smtClean="0"/>
-              <a:t>7</a:t>
-            </a:fld>
-            <a:endParaRPr kumimoji="1" lang="ja-JP" altLang="en-US"/>
-          </a:p>
-        </p:txBody>
-      </p:sp>
-    </p:spTree>
-    <p:extLst>
-      <p:ext uri="{BB962C8B-B14F-4D97-AF65-F5344CB8AC3E}">
-        <p14:creationId xmlns:p14="http://schemas.microsoft.com/office/powerpoint/2010/main" val="2069844945"/>
-      </p:ext>
-    </p:extLst>
-  </p:cSld>
-  <p:clrMapOvr>
-    <a:masterClrMapping/>
-  </p:clrMapOvr>
-</p:notes>
-</file>
-
-<file path=ppt/notesSlides/notesSlide7.xml><?xml version="1.0" encoding="utf-8"?>
-<p:notes xmlns:a="http://schemas.openxmlformats.org/drawingml/2006/main" xmlns:r="http://schemas.openxmlformats.org/officeDocument/2006/relationships" xmlns:p="http://schemas.openxmlformats.org/presentationml/2006/main">
-  <p:cSld>
-    <p:spTree>
-      <p:nvGrpSpPr>
-        <p:cNvPr id="1" name="">
-          <a:extLst>
-            <a:ext uri="{FF2B5EF4-FFF2-40B4-BE49-F238E27FC236}">
-              <a16:creationId xmlns:a16="http://schemas.microsoft.com/office/drawing/2014/main" id="{2435AB4F-3DFD-1B8B-65D5-3124EF809190}"/>
-            </a:ext>
-          </a:extLst>
-        </p:cNvPr>
-        <p:cNvGrpSpPr/>
-        <p:nvPr/>
-      </p:nvGrpSpPr>
-      <p:grpSpPr>
-        <a:xfrm>
-          <a:off x="0" y="0"/>
-          <a:ext cx="0" cy="0"/>
-          <a:chOff x="0" y="0"/>
-          <a:chExt cx="0" cy="0"/>
-        </a:xfrm>
-      </p:grpSpPr>
-      <p:sp>
-        <p:nvSpPr>
-          <p:cNvPr id="2" name="スライド イメージ プレースホルダー 1">
-            <a:extLst>
-              <a:ext uri="{FF2B5EF4-FFF2-40B4-BE49-F238E27FC236}">
-                <a16:creationId xmlns:a16="http://schemas.microsoft.com/office/drawing/2014/main" id="{4F53943A-6B0F-576A-0497-D13E573DBAFD}"/>
-              </a:ext>
-            </a:extLst>
-          </p:cNvPr>
-          <p:cNvSpPr>
-            <a:spLocks noGrp="1" noRot="1" noChangeAspect="1"/>
-          </p:cNvSpPr>
-          <p:nvPr>
-            <p:ph type="sldImg"/>
-          </p:nvPr>
-        </p:nvSpPr>
-        <p:spPr/>
-      </p:sp>
-      <p:sp>
-        <p:nvSpPr>
-          <p:cNvPr id="3" name="ノート プレースホルダー 2">
-            <a:extLst>
-              <a:ext uri="{FF2B5EF4-FFF2-40B4-BE49-F238E27FC236}">
-                <a16:creationId xmlns:a16="http://schemas.microsoft.com/office/drawing/2014/main" id="{2087B539-53CA-5071-9957-638A2875741B}"/>
-              </a:ext>
-            </a:extLst>
-          </p:cNvPr>
-          <p:cNvSpPr>
-            <a:spLocks noGrp="1"/>
-          </p:cNvSpPr>
-          <p:nvPr>
-            <p:ph type="body" idx="1"/>
-          </p:nvPr>
-        </p:nvSpPr>
-        <p:spPr/>
-        <p:txBody>
-          <a:bodyPr/>
-          <a:lstStyle/>
-          <a:p>
-            <a:endParaRPr lang="ja-JP" altLang="en-US">
-              <a:effectLst/>
-            </a:endParaRPr>
-          </a:p>
-        </p:txBody>
-      </p:sp>
-      <p:sp>
-        <p:nvSpPr>
-          <p:cNvPr id="4" name="スライド番号プレースホルダー 3">
-            <a:extLst>
-              <a:ext uri="{FF2B5EF4-FFF2-40B4-BE49-F238E27FC236}">
-                <a16:creationId xmlns:a16="http://schemas.microsoft.com/office/drawing/2014/main" id="{C39E77DF-C764-4107-69A1-C2B1BC7F7BE2}"/>
-              </a:ext>
-            </a:extLst>
-          </p:cNvPr>
-          <p:cNvSpPr>
-            <a:spLocks noGrp="1"/>
-          </p:cNvSpPr>
-          <p:nvPr>
-            <p:ph type="sldNum" sz="quarter" idx="5"/>
-          </p:nvPr>
-        </p:nvSpPr>
-        <p:spPr/>
-        <p:txBody>
-          <a:bodyPr/>
-          <a:lstStyle/>
-          <a:p>
-            <a:fld id="{423E85BE-9FAD-764D-B84A-7C70829A20A9}" type="slidenum">
-              <a:rPr kumimoji="1" lang="ja-JP" altLang="en-US" smtClean="0"/>
-              <a:t>8</a:t>
-            </a:fld>
-            <a:endParaRPr kumimoji="1" lang="ja-JP" altLang="en-US"/>
-          </a:p>
-        </p:txBody>
-      </p:sp>
-    </p:spTree>
-    <p:extLst>
-      <p:ext uri="{BB962C8B-B14F-4D97-AF65-F5344CB8AC3E}">
-        <p14:creationId xmlns:p14="http://schemas.microsoft.com/office/powerpoint/2010/main" val="4119038065"/>
-      </p:ext>
-    </p:extLst>
-  </p:cSld>
-  <p:clrMapOvr>
-    <a:masterClrMapping/>
-  </p:clrMapOvr>
-</p:notes>
-</file>
-
 <file path=ppt/slideLayouts/slideLayout1.xml><?xml version="1.0" encoding="utf-8"?>
 <p:sldLayout xmlns:a="http://schemas.openxmlformats.org/drawingml/2006/main" xmlns:r="http://schemas.openxmlformats.org/officeDocument/2006/relationships" xmlns:p="http://schemas.openxmlformats.org/presentationml/2006/main" type="title" preserve="1">
   <p:cSld name="Title Slide">
@@ -1482,7 +1149,7 @@
             <a:fld id="{1D8BD707-D9CF-40AE-B4C6-C98DA3205C09}" type="datetimeFigureOut">
               <a:rPr lang="en-US" smtClean="0"/>
               <a:pPr/>
-              <a:t>7/22/25</a:t>
+              <a:t>7/24/25</a:t>
             </a:fld>
             <a:endParaRPr lang="en-US"/>
           </a:p>
@@ -1647,7 +1314,7 @@
             <a:fld id="{1D8BD707-D9CF-40AE-B4C6-C98DA3205C09}" type="datetimeFigureOut">
               <a:rPr lang="en-US" smtClean="0"/>
               <a:pPr/>
-              <a:t>7/22/25</a:t>
+              <a:t>7/24/25</a:t>
             </a:fld>
             <a:endParaRPr lang="en-US"/>
           </a:p>
@@ -1822,7 +1489,7 @@
             <a:fld id="{1D8BD707-D9CF-40AE-B4C6-C98DA3205C09}" type="datetimeFigureOut">
               <a:rPr lang="en-US" smtClean="0"/>
               <a:pPr/>
-              <a:t>7/22/25</a:t>
+              <a:t>7/24/25</a:t>
             </a:fld>
             <a:endParaRPr lang="en-US"/>
           </a:p>
@@ -1987,7 +1654,7 @@
             <a:fld id="{1D8BD707-D9CF-40AE-B4C6-C98DA3205C09}" type="datetimeFigureOut">
               <a:rPr lang="en-US" smtClean="0"/>
               <a:pPr/>
-              <a:t>7/22/25</a:t>
+              <a:t>7/24/25</a:t>
             </a:fld>
             <a:endParaRPr lang="en-US"/>
           </a:p>
@@ -2229,7 +1896,7 @@
             <a:fld id="{1D8BD707-D9CF-40AE-B4C6-C98DA3205C09}" type="datetimeFigureOut">
               <a:rPr lang="en-US" smtClean="0"/>
               <a:pPr/>
-              <a:t>7/22/25</a:t>
+              <a:t>7/24/25</a:t>
             </a:fld>
             <a:endParaRPr lang="en-US"/>
           </a:p>
@@ -2511,7 +2178,7 @@
             <a:fld id="{1D8BD707-D9CF-40AE-B4C6-C98DA3205C09}" type="datetimeFigureOut">
               <a:rPr lang="en-US" smtClean="0"/>
               <a:pPr/>
-              <a:t>7/22/25</a:t>
+              <a:t>7/24/25</a:t>
             </a:fld>
             <a:endParaRPr lang="en-US"/>
           </a:p>
@@ -2927,7 +2594,7 @@
             <a:fld id="{1D8BD707-D9CF-40AE-B4C6-C98DA3205C09}" type="datetimeFigureOut">
               <a:rPr lang="en-US" smtClean="0"/>
               <a:pPr/>
-              <a:t>7/22/25</a:t>
+              <a:t>7/24/25</a:t>
             </a:fld>
             <a:endParaRPr lang="en-US"/>
           </a:p>
@@ -3041,7 +2708,7 @@
             <a:fld id="{1D8BD707-D9CF-40AE-B4C6-C98DA3205C09}" type="datetimeFigureOut">
               <a:rPr lang="en-US" smtClean="0"/>
               <a:pPr/>
-              <a:t>7/22/25</a:t>
+              <a:t>7/24/25</a:t>
             </a:fld>
             <a:endParaRPr lang="en-US"/>
           </a:p>
@@ -3133,7 +2800,7 @@
             <a:fld id="{1D8BD707-D9CF-40AE-B4C6-C98DA3205C09}" type="datetimeFigureOut">
               <a:rPr lang="en-US" smtClean="0"/>
               <a:pPr/>
-              <a:t>7/22/25</a:t>
+              <a:t>7/24/25</a:t>
             </a:fld>
             <a:endParaRPr lang="en-US"/>
           </a:p>
@@ -3405,7 +3072,7 @@
             <a:fld id="{1D8BD707-D9CF-40AE-B4C6-C98DA3205C09}" type="datetimeFigureOut">
               <a:rPr lang="en-US" smtClean="0"/>
               <a:pPr/>
-              <a:t>7/22/25</a:t>
+              <a:t>7/24/25</a:t>
             </a:fld>
             <a:endParaRPr lang="en-US"/>
           </a:p>
@@ -3654,7 +3321,7 @@
             <a:fld id="{1D8BD707-D9CF-40AE-B4C6-C98DA3205C09}" type="datetimeFigureOut">
               <a:rPr lang="en-US" smtClean="0"/>
               <a:pPr/>
-              <a:t>7/22/25</a:t>
+              <a:t>7/24/25</a:t>
             </a:fld>
             <a:endParaRPr lang="en-US"/>
           </a:p>
@@ -3862,7 +3529,7 @@
             <a:fld id="{1D8BD707-D9CF-40AE-B4C6-C98DA3205C09}" type="datetimeFigureOut">
               <a:rPr lang="en-US" smtClean="0"/>
               <a:pPr/>
-              <a:t>7/22/25</a:t>
+              <a:t>7/24/25</a:t>
             </a:fld>
             <a:endParaRPr lang="en-US"/>
           </a:p>
@@ -14256,1888 +13923,6 @@
 </p:sld>
 </file>
 
-<file path=ppt/slides/slide6.xml><?xml version="1.0" encoding="utf-8"?>
-<p:sld xmlns:a="http://schemas.openxmlformats.org/drawingml/2006/main" xmlns:r="http://schemas.openxmlformats.org/officeDocument/2006/relationships" xmlns:p="http://schemas.openxmlformats.org/presentationml/2006/main">
-  <p:cSld>
-    <p:spTree>
-      <p:nvGrpSpPr>
-        <p:cNvPr id="1" name="">
-          <a:extLst>
-            <a:ext uri="{FF2B5EF4-FFF2-40B4-BE49-F238E27FC236}">
-              <a16:creationId xmlns:a16="http://schemas.microsoft.com/office/drawing/2014/main" id="{FD5891FF-5866-6299-6DDD-D720216644C9}"/>
-            </a:ext>
-          </a:extLst>
-        </p:cNvPr>
-        <p:cNvGrpSpPr/>
-        <p:nvPr/>
-      </p:nvGrpSpPr>
-      <p:grpSpPr>
-        <a:xfrm>
-          <a:off x="0" y="0"/>
-          <a:ext cx="0" cy="0"/>
-          <a:chOff x="0" y="0"/>
-          <a:chExt cx="0" cy="0"/>
-        </a:xfrm>
-      </p:grpSpPr>
-      <p:sp>
-        <p:nvSpPr>
-          <p:cNvPr id="2" name="AutoShape 2">
-            <a:extLst>
-              <a:ext uri="{FF2B5EF4-FFF2-40B4-BE49-F238E27FC236}">
-                <a16:creationId xmlns:a16="http://schemas.microsoft.com/office/drawing/2014/main" id="{BD6C82D5-8C5C-20A4-6DE0-2BFE8EC7643C}"/>
-              </a:ext>
-            </a:extLst>
-          </p:cNvPr>
-          <p:cNvSpPr/>
-          <p:nvPr/>
-        </p:nvSpPr>
-        <p:spPr>
-          <a:xfrm>
-            <a:off x="857250" y="2361305"/>
-            <a:ext cx="16573500" cy="0"/>
-          </a:xfrm>
-          <a:prstGeom prst="line">
-            <a:avLst/>
-          </a:prstGeom>
-          <a:ln w="19050" cap="flat">
-            <a:solidFill>
-              <a:srgbClr val="1B1B1B"/>
-            </a:solidFill>
-            <a:prstDash val="solid"/>
-            <a:headEnd type="none" w="sm" len="sm"/>
-            <a:tailEnd type="none" w="sm" len="sm"/>
-          </a:ln>
-        </p:spPr>
-        <p:txBody>
-          <a:bodyPr/>
-          <a:lstStyle/>
-          <a:p>
-            <a:endParaRPr lang="ja-JP" altLang="en-US">
-              <a:latin typeface="Yu Gothic" panose="020B0400000000000000" pitchFamily="34" charset="-128"/>
-              <a:ea typeface="Yu Gothic" panose="020B0400000000000000" pitchFamily="34" charset="-128"/>
-            </a:endParaRPr>
-          </a:p>
-        </p:txBody>
-      </p:sp>
-      <p:sp>
-        <p:nvSpPr>
-          <p:cNvPr id="3" name="AutoShape 3">
-            <a:extLst>
-              <a:ext uri="{FF2B5EF4-FFF2-40B4-BE49-F238E27FC236}">
-                <a16:creationId xmlns:a16="http://schemas.microsoft.com/office/drawing/2014/main" id="{A7452E47-124A-D5F0-CE1C-0366DD0D5EA0}"/>
-              </a:ext>
-            </a:extLst>
-          </p:cNvPr>
-          <p:cNvSpPr/>
-          <p:nvPr/>
-        </p:nvSpPr>
-        <p:spPr>
-          <a:xfrm>
-            <a:off x="857250" y="1047750"/>
-            <a:ext cx="16573459" cy="0"/>
-          </a:xfrm>
-          <a:prstGeom prst="line">
-            <a:avLst/>
-          </a:prstGeom>
-          <a:ln w="19050" cap="flat">
-            <a:solidFill>
-              <a:srgbClr val="1B1B1B"/>
-            </a:solidFill>
-            <a:prstDash val="solid"/>
-            <a:headEnd type="none" w="sm" len="sm"/>
-            <a:tailEnd type="none" w="sm" len="sm"/>
-          </a:ln>
-        </p:spPr>
-        <p:txBody>
-          <a:bodyPr/>
-          <a:lstStyle/>
-          <a:p>
-            <a:endParaRPr lang="ja-JP" altLang="en-US">
-              <a:latin typeface="Yu Gothic" panose="020B0400000000000000" pitchFamily="34" charset="-128"/>
-              <a:ea typeface="Yu Gothic" panose="020B0400000000000000" pitchFamily="34" charset="-128"/>
-            </a:endParaRPr>
-          </a:p>
-        </p:txBody>
-      </p:sp>
-      <p:sp>
-        <p:nvSpPr>
-          <p:cNvPr id="4" name="AutoShape 4">
-            <a:extLst>
-              <a:ext uri="{FF2B5EF4-FFF2-40B4-BE49-F238E27FC236}">
-                <a16:creationId xmlns:a16="http://schemas.microsoft.com/office/drawing/2014/main" id="{BE931CFB-B526-B416-6C43-8A9D95FEE0BC}"/>
-              </a:ext>
-            </a:extLst>
-          </p:cNvPr>
-          <p:cNvSpPr/>
-          <p:nvPr/>
-        </p:nvSpPr>
-        <p:spPr>
-          <a:xfrm flipV="1">
-            <a:off x="856856" y="904405"/>
-            <a:ext cx="16574288" cy="0"/>
-          </a:xfrm>
-          <a:prstGeom prst="line">
-            <a:avLst/>
-          </a:prstGeom>
-          <a:ln w="57150" cap="flat">
-            <a:solidFill>
-              <a:srgbClr val="1B1B1B"/>
-            </a:solidFill>
-            <a:prstDash val="solid"/>
-            <a:headEnd type="none" w="sm" len="sm"/>
-            <a:tailEnd type="none" w="sm" len="sm"/>
-          </a:ln>
-        </p:spPr>
-        <p:txBody>
-          <a:bodyPr/>
-          <a:lstStyle/>
-          <a:p>
-            <a:endParaRPr lang="ja-JP" altLang="en-US">
-              <a:latin typeface="Yu Gothic" panose="020B0400000000000000" pitchFamily="34" charset="-128"/>
-              <a:ea typeface="Yu Gothic" panose="020B0400000000000000" pitchFamily="34" charset="-128"/>
-            </a:endParaRPr>
-          </a:p>
-        </p:txBody>
-      </p:sp>
-      <p:sp>
-        <p:nvSpPr>
-          <p:cNvPr id="5" name="AutoShape 5">
-            <a:extLst>
-              <a:ext uri="{FF2B5EF4-FFF2-40B4-BE49-F238E27FC236}">
-                <a16:creationId xmlns:a16="http://schemas.microsoft.com/office/drawing/2014/main" id="{137934B2-67B4-2D33-DB69-1E7DE3EB3159}"/>
-              </a:ext>
-            </a:extLst>
-          </p:cNvPr>
-          <p:cNvSpPr/>
-          <p:nvPr/>
-        </p:nvSpPr>
-        <p:spPr>
-          <a:xfrm>
-            <a:off x="857250" y="9382595"/>
-            <a:ext cx="16573500" cy="0"/>
-          </a:xfrm>
-          <a:prstGeom prst="line">
-            <a:avLst/>
-          </a:prstGeom>
-          <a:ln w="57150" cap="flat">
-            <a:solidFill>
-              <a:srgbClr val="1B1B1B"/>
-            </a:solidFill>
-            <a:prstDash val="solid"/>
-            <a:headEnd type="none" w="sm" len="sm"/>
-            <a:tailEnd type="none" w="sm" len="sm"/>
-          </a:ln>
-        </p:spPr>
-        <p:txBody>
-          <a:bodyPr/>
-          <a:lstStyle/>
-          <a:p>
-            <a:endParaRPr lang="ja-JP" altLang="en-US">
-              <a:latin typeface="Yu Gothic" panose="020B0400000000000000" pitchFamily="34" charset="-128"/>
-              <a:ea typeface="Yu Gothic" panose="020B0400000000000000" pitchFamily="34" charset="-128"/>
-            </a:endParaRPr>
-          </a:p>
-        </p:txBody>
-      </p:sp>
-      <p:sp>
-        <p:nvSpPr>
-          <p:cNvPr id="6" name="AutoShape 6">
-            <a:extLst>
-              <a:ext uri="{FF2B5EF4-FFF2-40B4-BE49-F238E27FC236}">
-                <a16:creationId xmlns:a16="http://schemas.microsoft.com/office/drawing/2014/main" id="{56F18E94-4A95-1434-5FD9-91C9244C99C5}"/>
-              </a:ext>
-            </a:extLst>
-          </p:cNvPr>
-          <p:cNvSpPr/>
-          <p:nvPr/>
-        </p:nvSpPr>
-        <p:spPr>
-          <a:xfrm>
-            <a:off x="857250" y="9239250"/>
-            <a:ext cx="16573500" cy="0"/>
-          </a:xfrm>
-          <a:prstGeom prst="line">
-            <a:avLst/>
-          </a:prstGeom>
-          <a:ln w="19050" cap="flat">
-            <a:solidFill>
-              <a:srgbClr val="1B1B1B"/>
-            </a:solidFill>
-            <a:prstDash val="solid"/>
-            <a:headEnd type="none" w="sm" len="sm"/>
-            <a:tailEnd type="none" w="sm" len="sm"/>
-          </a:ln>
-        </p:spPr>
-        <p:txBody>
-          <a:bodyPr/>
-          <a:lstStyle/>
-          <a:p>
-            <a:endParaRPr lang="ja-JP" altLang="en-US">
-              <a:latin typeface="Yu Gothic" panose="020B0400000000000000" pitchFamily="34" charset="-128"/>
-              <a:ea typeface="Yu Gothic" panose="020B0400000000000000" pitchFamily="34" charset="-128"/>
-            </a:endParaRPr>
-          </a:p>
-        </p:txBody>
-      </p:sp>
-      <p:grpSp>
-        <p:nvGrpSpPr>
-          <p:cNvPr id="7" name="Group 7">
-            <a:extLst>
-              <a:ext uri="{FF2B5EF4-FFF2-40B4-BE49-F238E27FC236}">
-                <a16:creationId xmlns:a16="http://schemas.microsoft.com/office/drawing/2014/main" id="{FA1F6B92-0446-59D0-CF7B-26E7C664BB01}"/>
-              </a:ext>
-            </a:extLst>
-          </p:cNvPr>
-          <p:cNvGrpSpPr/>
-          <p:nvPr/>
-        </p:nvGrpSpPr>
-        <p:grpSpPr>
-          <a:xfrm>
-            <a:off x="1282599" y="650625"/>
-            <a:ext cx="1213487" cy="1720205"/>
-            <a:chOff x="0" y="0"/>
-            <a:chExt cx="319601" cy="453058"/>
-          </a:xfrm>
-        </p:grpSpPr>
-        <p:sp>
-          <p:nvSpPr>
-            <p:cNvPr id="8" name="Freeform 8">
-              <a:extLst>
-                <a:ext uri="{FF2B5EF4-FFF2-40B4-BE49-F238E27FC236}">
-                  <a16:creationId xmlns:a16="http://schemas.microsoft.com/office/drawing/2014/main" id="{6895D817-783A-134A-FF98-2414D9C20E69}"/>
-                </a:ext>
-              </a:extLst>
-            </p:cNvPr>
-            <p:cNvSpPr/>
-            <p:nvPr/>
-          </p:nvSpPr>
-          <p:spPr>
-            <a:xfrm>
-              <a:off x="0" y="0"/>
-              <a:ext cx="319601" cy="453058"/>
-            </a:xfrm>
-            <a:custGeom>
-              <a:avLst/>
-              <a:gdLst/>
-              <a:ahLst/>
-              <a:cxnLst/>
-              <a:rect l="l" t="t" r="r" b="b"/>
-              <a:pathLst>
-                <a:path w="319601" h="453058">
-                  <a:moveTo>
-                    <a:pt x="0" y="0"/>
-                  </a:moveTo>
-                  <a:lnTo>
-                    <a:pt x="319601" y="0"/>
-                  </a:lnTo>
-                  <a:lnTo>
-                    <a:pt x="319601" y="453058"/>
-                  </a:lnTo>
-                  <a:lnTo>
-                    <a:pt x="0" y="453058"/>
-                  </a:lnTo>
-                  <a:close/>
-                </a:path>
-              </a:pathLst>
-            </a:custGeom>
-            <a:solidFill>
-              <a:srgbClr val="1B1B1B"/>
-            </a:solidFill>
-          </p:spPr>
-          <p:txBody>
-            <a:bodyPr/>
-            <a:lstStyle/>
-            <a:p>
-              <a:endParaRPr lang="ja-JP" altLang="en-US">
-                <a:latin typeface="Yu Gothic" panose="020B0400000000000000" pitchFamily="34" charset="-128"/>
-                <a:ea typeface="Yu Gothic" panose="020B0400000000000000" pitchFamily="34" charset="-128"/>
-              </a:endParaRPr>
-            </a:p>
-          </p:txBody>
-        </p:sp>
-        <p:sp>
-          <p:nvSpPr>
-            <p:cNvPr id="9" name="TextBox 9">
-              <a:extLst>
-                <a:ext uri="{FF2B5EF4-FFF2-40B4-BE49-F238E27FC236}">
-                  <a16:creationId xmlns:a16="http://schemas.microsoft.com/office/drawing/2014/main" id="{BA81D070-1858-B24C-F7DC-4D675B0E4FDA}"/>
-                </a:ext>
-              </a:extLst>
-            </p:cNvPr>
-            <p:cNvSpPr txBox="1"/>
-            <p:nvPr/>
-          </p:nvSpPr>
-          <p:spPr>
-            <a:xfrm>
-              <a:off x="0" y="-47625"/>
-              <a:ext cx="319601" cy="500683"/>
-            </a:xfrm>
-            <a:prstGeom prst="rect">
-              <a:avLst/>
-            </a:prstGeom>
-          </p:spPr>
-          <p:txBody>
-            <a:bodyPr lIns="50800" tIns="50800" rIns="50800" bIns="50800" rtlCol="0" anchor="ctr"/>
-            <a:lstStyle/>
-            <a:p>
-              <a:pPr algn="ctr">
-                <a:lnSpc>
-                  <a:spcPts val="3359"/>
-                </a:lnSpc>
-              </a:pPr>
-              <a:endParaRPr>
-                <a:latin typeface="Yu Gothic" panose="020B0400000000000000" pitchFamily="34" charset="-128"/>
-                <a:ea typeface="Yu Gothic" panose="020B0400000000000000" pitchFamily="34" charset="-128"/>
-              </a:endParaRPr>
-            </a:p>
-          </p:txBody>
-        </p:sp>
-      </p:grpSp>
-      <p:sp>
-        <p:nvSpPr>
-          <p:cNvPr id="12" name="TextBox 12">
-            <a:extLst>
-              <a:ext uri="{FF2B5EF4-FFF2-40B4-BE49-F238E27FC236}">
-                <a16:creationId xmlns:a16="http://schemas.microsoft.com/office/drawing/2014/main" id="{B1824D78-0DD3-2CFA-FF91-AFC0713ED34C}"/>
-              </a:ext>
-            </a:extLst>
-          </p:cNvPr>
-          <p:cNvSpPr txBox="1"/>
-          <p:nvPr/>
-        </p:nvSpPr>
-        <p:spPr>
-          <a:xfrm>
-            <a:off x="2949343" y="1371153"/>
-            <a:ext cx="14309957" cy="596317"/>
-          </a:xfrm>
-          <a:prstGeom prst="rect">
-            <a:avLst/>
-          </a:prstGeom>
-        </p:spPr>
-        <p:txBody>
-          <a:bodyPr lIns="0" tIns="0" rIns="0" bIns="0" rtlCol="0" anchor="t">
-            <a:spAutoFit/>
-          </a:bodyPr>
-          <a:lstStyle/>
-          <a:p>
-            <a:pPr algn="l">
-              <a:lnSpc>
-                <a:spcPts val="4900"/>
-              </a:lnSpc>
-            </a:pPr>
-            <a:r>
-              <a:rPr lang="ja-JP" altLang="en-US" sz="3500" b="1" spc="175">
-                <a:solidFill>
-                  <a:srgbClr val="1B1B1B"/>
-                </a:solidFill>
-                <a:latin typeface="Yu Gothic" panose="020B0400000000000000" pitchFamily="34" charset="-128"/>
-                <a:ea typeface="Yu Gothic" panose="020B0400000000000000" pitchFamily="34" charset="-128"/>
-                <a:cs typeface="Noto Sans JP Heavy"/>
-                <a:sym typeface="Noto Sans JP Heavy"/>
-              </a:rPr>
-              <a:t>ユーザーアクション</a:t>
-            </a:r>
-            <a:r>
-              <a:rPr lang="en-US" altLang="ja-JP" sz="3500" b="1" spc="175" dirty="0">
-                <a:solidFill>
-                  <a:srgbClr val="1B1B1B"/>
-                </a:solidFill>
-                <a:latin typeface="Yu Gothic" panose="020B0400000000000000" pitchFamily="34" charset="-128"/>
-                <a:ea typeface="Yu Gothic" panose="020B0400000000000000" pitchFamily="34" charset="-128"/>
-                <a:cs typeface="Noto Sans JP Heavy"/>
-                <a:sym typeface="Noto Sans JP Heavy"/>
-              </a:rPr>
-              <a:t> – </a:t>
-            </a:r>
-            <a:r>
-              <a:rPr lang="ja-JP" altLang="en-US" sz="3500" b="1" spc="175">
-                <a:solidFill>
-                  <a:srgbClr val="1B1B1B"/>
-                </a:solidFill>
-                <a:latin typeface="Yu Gothic" panose="020B0400000000000000" pitchFamily="34" charset="-128"/>
-                <a:ea typeface="Yu Gothic" panose="020B0400000000000000" pitchFamily="34" charset="-128"/>
-                <a:cs typeface="Noto Sans JP Heavy"/>
-                <a:sym typeface="Noto Sans JP Heavy"/>
-              </a:rPr>
-              <a:t>アカウント作成・ログイン</a:t>
-            </a:r>
-            <a:endParaRPr lang="en-US" sz="3500" b="1" spc="175" dirty="0">
-              <a:solidFill>
-                <a:srgbClr val="1B1B1B"/>
-              </a:solidFill>
-              <a:latin typeface="Yu Gothic" panose="020B0400000000000000" pitchFamily="34" charset="-128"/>
-              <a:ea typeface="Yu Gothic" panose="020B0400000000000000" pitchFamily="34" charset="-128"/>
-              <a:cs typeface="Noto Sans JP Heavy"/>
-              <a:sym typeface="Noto Sans JP Heavy"/>
-            </a:endParaRPr>
-          </a:p>
-        </p:txBody>
-      </p:sp>
-      <p:sp>
-        <p:nvSpPr>
-          <p:cNvPr id="13" name="TextBox 13">
-            <a:extLst>
-              <a:ext uri="{FF2B5EF4-FFF2-40B4-BE49-F238E27FC236}">
-                <a16:creationId xmlns:a16="http://schemas.microsoft.com/office/drawing/2014/main" id="{70AF47E0-22D5-F1D7-AE25-77F145284C4F}"/>
-              </a:ext>
-            </a:extLst>
-          </p:cNvPr>
-          <p:cNvSpPr txBox="1"/>
-          <p:nvPr/>
-        </p:nvSpPr>
-        <p:spPr>
-          <a:xfrm>
-            <a:off x="1461953" y="1228278"/>
-            <a:ext cx="854779" cy="733425"/>
-          </a:xfrm>
-          <a:prstGeom prst="rect">
-            <a:avLst/>
-          </a:prstGeom>
-        </p:spPr>
-        <p:txBody>
-          <a:bodyPr lIns="0" tIns="0" rIns="0" bIns="0" rtlCol="0" anchor="t">
-            <a:spAutoFit/>
-          </a:bodyPr>
-          <a:lstStyle/>
-          <a:p>
-            <a:pPr marL="0" lvl="0" indent="0" algn="ctr">
-              <a:lnSpc>
-                <a:spcPts val="6300"/>
-              </a:lnSpc>
-              <a:spcBef>
-                <a:spcPct val="0"/>
-              </a:spcBef>
-            </a:pPr>
-            <a:r>
-              <a:rPr lang="en-US" sz="3500" b="1" u="none" strike="noStrike" dirty="0">
-                <a:solidFill>
-                  <a:srgbClr val="FAFAFA"/>
-                </a:solidFill>
-                <a:latin typeface="Yu Gothic" panose="020B0400000000000000" pitchFamily="34" charset="-128"/>
-                <a:ea typeface="Yu Gothic" panose="020B0400000000000000" pitchFamily="34" charset="-128"/>
-                <a:cs typeface="Open Sans Bold"/>
-                <a:sym typeface="Open Sans Bold"/>
-              </a:rPr>
-              <a:t>04</a:t>
-            </a:r>
-          </a:p>
-        </p:txBody>
-      </p:sp>
-      <p:sp>
-        <p:nvSpPr>
-          <p:cNvPr id="47" name="右矢印 46">
-            <a:extLst>
-              <a:ext uri="{FF2B5EF4-FFF2-40B4-BE49-F238E27FC236}">
-                <a16:creationId xmlns:a16="http://schemas.microsoft.com/office/drawing/2014/main" id="{331266CA-75C3-4838-C9DD-CBCE2F48091E}"/>
-              </a:ext>
-            </a:extLst>
-          </p:cNvPr>
-          <p:cNvSpPr/>
-          <p:nvPr/>
-        </p:nvSpPr>
-        <p:spPr>
-          <a:xfrm>
-            <a:off x="6687436" y="4013338"/>
-            <a:ext cx="6237398" cy="1393104"/>
-          </a:xfrm>
-          <a:prstGeom prst="rightArrow">
-            <a:avLst>
-              <a:gd name="adj1" fmla="val 50000"/>
-              <a:gd name="adj2" fmla="val 44620"/>
-            </a:avLst>
-          </a:prstGeom>
-          <a:solidFill>
-            <a:srgbClr val="C0D8C3"/>
-          </a:solidFill>
-          <a:ln>
-            <a:solidFill>
-              <a:schemeClr val="accent3">
-                <a:lumMod val="50000"/>
-              </a:schemeClr>
-            </a:solidFill>
-          </a:ln>
-        </p:spPr>
-        <p:style>
-          <a:lnRef idx="2">
-            <a:schemeClr val="accent1">
-              <a:shade val="15000"/>
-            </a:schemeClr>
-          </a:lnRef>
-          <a:fillRef idx="1">
-            <a:schemeClr val="accent1"/>
-          </a:fillRef>
-          <a:effectRef idx="0">
-            <a:schemeClr val="accent1"/>
-          </a:effectRef>
-          <a:fontRef idx="minor">
-            <a:schemeClr val="lt1"/>
-          </a:fontRef>
-        </p:style>
-        <p:txBody>
-          <a:bodyPr rtlCol="0" anchor="ctr"/>
-          <a:lstStyle/>
-          <a:p>
-            <a:pPr algn="ctr"/>
-            <a:endParaRPr kumimoji="1" lang="ja-JP" altLang="en-US"/>
-          </a:p>
-        </p:txBody>
-      </p:sp>
-      <p:pic>
-        <p:nvPicPr>
-          <p:cNvPr id="21" name="図 20" descr="グラフィカル ユーザー インターフェイス, アプリケーション&#10;&#10;AI 生成コンテンツは誤りを含む可能性があります。">
-            <a:extLst>
-              <a:ext uri="{FF2B5EF4-FFF2-40B4-BE49-F238E27FC236}">
-                <a16:creationId xmlns:a16="http://schemas.microsoft.com/office/drawing/2014/main" id="{CCA6F439-C5BB-F39A-2F47-FD70234E1C22}"/>
-              </a:ext>
-            </a:extLst>
-          </p:cNvPr>
-          <p:cNvPicPr>
-            <a:picLocks noChangeAspect="1"/>
-          </p:cNvPicPr>
-          <p:nvPr/>
-        </p:nvPicPr>
-        <p:blipFill>
-          <a:blip r:embed="rId3">
-            <a:extLst>
-              <a:ext uri="{28A0092B-C50C-407E-A947-70E740481C1C}">
-                <a14:useLocalDpi xmlns:a14="http://schemas.microsoft.com/office/drawing/2010/main" val="0"/>
-              </a:ext>
-            </a:extLst>
-          </a:blip>
-          <a:srcRect l="26095" t="5613" r="26095" b="33250"/>
-          <a:stretch>
-            <a:fillRect/>
-          </a:stretch>
-        </p:blipFill>
-        <p:spPr>
-          <a:xfrm>
-            <a:off x="7657952" y="2559105"/>
-            <a:ext cx="3747600" cy="2857563"/>
-          </a:xfrm>
-          <a:prstGeom prst="rect">
-            <a:avLst/>
-          </a:prstGeom>
-          <a:ln>
-            <a:solidFill>
-              <a:schemeClr val="tx1"/>
-            </a:solidFill>
-          </a:ln>
-        </p:spPr>
-      </p:pic>
-      <p:pic>
-        <p:nvPicPr>
-          <p:cNvPr id="25" name="図 24" descr="グラフィカル ユーザー インターフェイス, アプリケーション&#10;&#10;AI 生成コンテンツは誤りを含む可能性があります。">
-            <a:extLst>
-              <a:ext uri="{FF2B5EF4-FFF2-40B4-BE49-F238E27FC236}">
-                <a16:creationId xmlns:a16="http://schemas.microsoft.com/office/drawing/2014/main" id="{94834A43-9E96-B395-B381-893BB8E651A9}"/>
-              </a:ext>
-            </a:extLst>
-          </p:cNvPr>
-          <p:cNvPicPr>
-            <a:picLocks noChangeAspect="1"/>
-          </p:cNvPicPr>
-          <p:nvPr/>
-        </p:nvPicPr>
-        <p:blipFill>
-          <a:blip r:embed="rId4">
-            <a:extLst>
-              <a:ext uri="{28A0092B-C50C-407E-A947-70E740481C1C}">
-                <a14:useLocalDpi xmlns:a14="http://schemas.microsoft.com/office/drawing/2010/main" val="0"/>
-              </a:ext>
-            </a:extLst>
-          </a:blip>
-          <a:srcRect l="26874" r="25228" b="45325"/>
-          <a:stretch>
-            <a:fillRect/>
-          </a:stretch>
-        </p:blipFill>
-        <p:spPr>
-          <a:xfrm>
-            <a:off x="1579892" y="4013338"/>
-            <a:ext cx="5107544" cy="3276000"/>
-          </a:xfrm>
-          <a:prstGeom prst="rect">
-            <a:avLst/>
-          </a:prstGeom>
-          <a:ln>
-            <a:solidFill>
-              <a:schemeClr val="tx1"/>
-            </a:solidFill>
-          </a:ln>
-        </p:spPr>
-      </p:pic>
-      <p:sp>
-        <p:nvSpPr>
-          <p:cNvPr id="49" name="右矢印 48">
-            <a:extLst>
-              <a:ext uri="{FF2B5EF4-FFF2-40B4-BE49-F238E27FC236}">
-                <a16:creationId xmlns:a16="http://schemas.microsoft.com/office/drawing/2014/main" id="{46149983-3E69-8699-AB25-0A2B28E25A81}"/>
-              </a:ext>
-            </a:extLst>
-          </p:cNvPr>
-          <p:cNvSpPr/>
-          <p:nvPr/>
-        </p:nvSpPr>
-        <p:spPr>
-          <a:xfrm>
-            <a:off x="6687436" y="6039578"/>
-            <a:ext cx="6237398" cy="1393104"/>
-          </a:xfrm>
-          <a:prstGeom prst="rightArrow">
-            <a:avLst>
-              <a:gd name="adj1" fmla="val 50000"/>
-              <a:gd name="adj2" fmla="val 44620"/>
-            </a:avLst>
-          </a:prstGeom>
-          <a:solidFill>
-            <a:srgbClr val="AFC5D9"/>
-          </a:solidFill>
-          <a:ln>
-            <a:solidFill>
-              <a:schemeClr val="tx2">
-                <a:lumMod val="50000"/>
-              </a:schemeClr>
-            </a:solidFill>
-          </a:ln>
-        </p:spPr>
-        <p:style>
-          <a:lnRef idx="2">
-            <a:schemeClr val="accent1">
-              <a:shade val="15000"/>
-            </a:schemeClr>
-          </a:lnRef>
-          <a:fillRef idx="1">
-            <a:schemeClr val="accent1"/>
-          </a:fillRef>
-          <a:effectRef idx="0">
-            <a:schemeClr val="accent1"/>
-          </a:effectRef>
-          <a:fontRef idx="minor">
-            <a:schemeClr val="lt1"/>
-          </a:fontRef>
-        </p:style>
-        <p:txBody>
-          <a:bodyPr rtlCol="0" anchor="ctr"/>
-          <a:lstStyle/>
-          <a:p>
-            <a:pPr algn="ctr"/>
-            <a:endParaRPr kumimoji="1" lang="ja-JP" altLang="en-US"/>
-          </a:p>
-        </p:txBody>
-      </p:sp>
-      <p:pic>
-        <p:nvPicPr>
-          <p:cNvPr id="48" name="図 47" descr="グラフィカル ユーザー インターフェイス, アプリケーション&#10;&#10;AI 生成コンテンツは誤りを含む可能性があります。">
-            <a:extLst>
-              <a:ext uri="{FF2B5EF4-FFF2-40B4-BE49-F238E27FC236}">
-                <a16:creationId xmlns:a16="http://schemas.microsoft.com/office/drawing/2014/main" id="{D1B97C1D-68D4-F239-DBFE-D1327F997049}"/>
-              </a:ext>
-            </a:extLst>
-          </p:cNvPr>
-          <p:cNvPicPr>
-            <a:picLocks noChangeAspect="1"/>
-          </p:cNvPicPr>
-          <p:nvPr/>
-        </p:nvPicPr>
-        <p:blipFill>
-          <a:blip r:embed="rId5">
-            <a:extLst>
-              <a:ext uri="{28A0092B-C50C-407E-A947-70E740481C1C}">
-                <a14:useLocalDpi xmlns:a14="http://schemas.microsoft.com/office/drawing/2010/main" val="0"/>
-              </a:ext>
-            </a:extLst>
-          </a:blip>
-          <a:srcRect l="24492" r="24875" b="25072"/>
-          <a:stretch>
-            <a:fillRect/>
-          </a:stretch>
-        </p:blipFill>
-        <p:spPr>
-          <a:xfrm>
-            <a:off x="7657148" y="5933043"/>
-            <a:ext cx="3748404" cy="3120570"/>
-          </a:xfrm>
-          <a:prstGeom prst="rect">
-            <a:avLst/>
-          </a:prstGeom>
-          <a:ln>
-            <a:solidFill>
-              <a:schemeClr val="tx1"/>
-            </a:solidFill>
-          </a:ln>
-        </p:spPr>
-      </p:pic>
-      <p:sp>
-        <p:nvSpPr>
-          <p:cNvPr id="50" name="テキスト ボックス 49">
-            <a:extLst>
-              <a:ext uri="{FF2B5EF4-FFF2-40B4-BE49-F238E27FC236}">
-                <a16:creationId xmlns:a16="http://schemas.microsoft.com/office/drawing/2014/main" id="{49EF1D6B-ABD7-2545-1533-5CA8A920FDC2}"/>
-              </a:ext>
-            </a:extLst>
-          </p:cNvPr>
-          <p:cNvSpPr txBox="1"/>
-          <p:nvPr/>
-        </p:nvSpPr>
-        <p:spPr>
-          <a:xfrm>
-            <a:off x="5029200" y="3380202"/>
-            <a:ext cx="2563522" cy="523220"/>
-          </a:xfrm>
-          <a:prstGeom prst="rect">
-            <a:avLst/>
-          </a:prstGeom>
-          <a:noFill/>
-        </p:spPr>
-        <p:txBody>
-          <a:bodyPr wrap="none" rtlCol="0">
-            <a:spAutoFit/>
-          </a:bodyPr>
-          <a:lstStyle/>
-          <a:p>
-            <a:r>
-              <a:rPr kumimoji="1" lang="ja-JP" altLang="en-US" sz="2800">
-                <a:highlight>
-                  <a:srgbClr val="C0D8C3"/>
-                </a:highlight>
-              </a:rPr>
-              <a:t>初回：新規登録</a:t>
-            </a:r>
-          </a:p>
-        </p:txBody>
-      </p:sp>
-      <p:sp>
-        <p:nvSpPr>
-          <p:cNvPr id="51" name="テキスト ボックス 50">
-            <a:extLst>
-              <a:ext uri="{FF2B5EF4-FFF2-40B4-BE49-F238E27FC236}">
-                <a16:creationId xmlns:a16="http://schemas.microsoft.com/office/drawing/2014/main" id="{40C625FA-C726-A94B-65DE-F4C0A88BBF2F}"/>
-              </a:ext>
-            </a:extLst>
-          </p:cNvPr>
-          <p:cNvSpPr txBox="1"/>
-          <p:nvPr/>
-        </p:nvSpPr>
-        <p:spPr>
-          <a:xfrm>
-            <a:off x="4521047" y="7489191"/>
-            <a:ext cx="3054041" cy="523220"/>
-          </a:xfrm>
-          <a:prstGeom prst="rect">
-            <a:avLst/>
-          </a:prstGeom>
-          <a:noFill/>
-        </p:spPr>
-        <p:txBody>
-          <a:bodyPr wrap="none" rtlCol="0">
-            <a:spAutoFit/>
-          </a:bodyPr>
-          <a:lstStyle/>
-          <a:p>
-            <a:r>
-              <a:rPr kumimoji="1" lang="ja-JP" altLang="en-US" sz="2800">
-                <a:highlight>
-                  <a:srgbClr val="AFC5D9"/>
-                </a:highlight>
-              </a:rPr>
-              <a:t>初回以降：ログイン</a:t>
-            </a:r>
-          </a:p>
-        </p:txBody>
-      </p:sp>
-      <p:pic>
-        <p:nvPicPr>
-          <p:cNvPr id="11" name="図 10" descr="グラフィカル ユーザー インターフェイス, アプリケーション, Web サイト&#10;&#10;AI 生成コンテンツは誤りを含む可能性があります。">
-            <a:extLst>
-              <a:ext uri="{FF2B5EF4-FFF2-40B4-BE49-F238E27FC236}">
-                <a16:creationId xmlns:a16="http://schemas.microsoft.com/office/drawing/2014/main" id="{63D02843-4095-1E7B-0CD9-A9FCF31FEFBA}"/>
-              </a:ext>
-            </a:extLst>
-          </p:cNvPr>
-          <p:cNvPicPr>
-            <a:picLocks noChangeAspect="1"/>
-          </p:cNvPicPr>
-          <p:nvPr/>
-        </p:nvPicPr>
-        <p:blipFill>
-          <a:blip r:embed="rId6">
-            <a:extLst>
-              <a:ext uri="{28A0092B-C50C-407E-A947-70E740481C1C}">
-                <a14:useLocalDpi xmlns:a14="http://schemas.microsoft.com/office/drawing/2010/main" val="0"/>
-              </a:ext>
-            </a:extLst>
-          </a:blip>
-          <a:srcRect l="11983" t="10846" r="22304" b="14504"/>
-          <a:stretch>
-            <a:fillRect/>
-          </a:stretch>
-        </p:blipFill>
-        <p:spPr>
-          <a:xfrm>
-            <a:off x="12951856" y="4013338"/>
-            <a:ext cx="5107544" cy="3276000"/>
-          </a:xfrm>
-          <a:prstGeom prst="rect">
-            <a:avLst/>
-          </a:prstGeom>
-          <a:ln>
-            <a:solidFill>
-              <a:schemeClr val="tx1"/>
-            </a:solidFill>
-          </a:ln>
-        </p:spPr>
-      </p:pic>
-    </p:spTree>
-    <p:extLst>
-      <p:ext uri="{BB962C8B-B14F-4D97-AF65-F5344CB8AC3E}">
-        <p14:creationId xmlns:p14="http://schemas.microsoft.com/office/powerpoint/2010/main" val="2560638179"/>
-      </p:ext>
-    </p:extLst>
-  </p:cSld>
-  <p:clrMapOvr>
-    <a:masterClrMapping/>
-  </p:clrMapOvr>
-</p:sld>
-</file>
-
-<file path=ppt/slides/slide7.xml><?xml version="1.0" encoding="utf-8"?>
-<p:sld xmlns:a="http://schemas.openxmlformats.org/drawingml/2006/main" xmlns:r="http://schemas.openxmlformats.org/officeDocument/2006/relationships" xmlns:p="http://schemas.openxmlformats.org/presentationml/2006/main">
-  <p:cSld>
-    <p:spTree>
-      <p:nvGrpSpPr>
-        <p:cNvPr id="1" name="">
-          <a:extLst>
-            <a:ext uri="{FF2B5EF4-FFF2-40B4-BE49-F238E27FC236}">
-              <a16:creationId xmlns:a16="http://schemas.microsoft.com/office/drawing/2014/main" id="{29E719E2-88C4-32A9-482B-C29DAD826CB7}"/>
-            </a:ext>
-          </a:extLst>
-        </p:cNvPr>
-        <p:cNvGrpSpPr/>
-        <p:nvPr/>
-      </p:nvGrpSpPr>
-      <p:grpSpPr>
-        <a:xfrm>
-          <a:off x="0" y="0"/>
-          <a:ext cx="0" cy="0"/>
-          <a:chOff x="0" y="0"/>
-          <a:chExt cx="0" cy="0"/>
-        </a:xfrm>
-      </p:grpSpPr>
-      <p:sp>
-        <p:nvSpPr>
-          <p:cNvPr id="2" name="AutoShape 2">
-            <a:extLst>
-              <a:ext uri="{FF2B5EF4-FFF2-40B4-BE49-F238E27FC236}">
-                <a16:creationId xmlns:a16="http://schemas.microsoft.com/office/drawing/2014/main" id="{A9FCE7B6-268C-18B5-50E8-86A5D8AF9280}"/>
-              </a:ext>
-            </a:extLst>
-          </p:cNvPr>
-          <p:cNvSpPr/>
-          <p:nvPr/>
-        </p:nvSpPr>
-        <p:spPr>
-          <a:xfrm>
-            <a:off x="857250" y="2361305"/>
-            <a:ext cx="16573500" cy="0"/>
-          </a:xfrm>
-          <a:prstGeom prst="line">
-            <a:avLst/>
-          </a:prstGeom>
-          <a:ln w="19050" cap="flat">
-            <a:solidFill>
-              <a:srgbClr val="1B1B1B"/>
-            </a:solidFill>
-            <a:prstDash val="solid"/>
-            <a:headEnd type="none" w="sm" len="sm"/>
-            <a:tailEnd type="none" w="sm" len="sm"/>
-          </a:ln>
-        </p:spPr>
-        <p:txBody>
-          <a:bodyPr/>
-          <a:lstStyle/>
-          <a:p>
-            <a:endParaRPr lang="ja-JP" altLang="en-US">
-              <a:latin typeface="Yu Gothic" panose="020B0400000000000000" pitchFamily="34" charset="-128"/>
-              <a:ea typeface="Yu Gothic" panose="020B0400000000000000" pitchFamily="34" charset="-128"/>
-            </a:endParaRPr>
-          </a:p>
-        </p:txBody>
-      </p:sp>
-      <p:sp>
-        <p:nvSpPr>
-          <p:cNvPr id="3" name="AutoShape 3">
-            <a:extLst>
-              <a:ext uri="{FF2B5EF4-FFF2-40B4-BE49-F238E27FC236}">
-                <a16:creationId xmlns:a16="http://schemas.microsoft.com/office/drawing/2014/main" id="{F263E431-678B-3638-BB4C-653E574C88C4}"/>
-              </a:ext>
-            </a:extLst>
-          </p:cNvPr>
-          <p:cNvSpPr/>
-          <p:nvPr/>
-        </p:nvSpPr>
-        <p:spPr>
-          <a:xfrm>
-            <a:off x="857250" y="1047750"/>
-            <a:ext cx="16573459" cy="0"/>
-          </a:xfrm>
-          <a:prstGeom prst="line">
-            <a:avLst/>
-          </a:prstGeom>
-          <a:ln w="19050" cap="flat">
-            <a:solidFill>
-              <a:srgbClr val="1B1B1B"/>
-            </a:solidFill>
-            <a:prstDash val="solid"/>
-            <a:headEnd type="none" w="sm" len="sm"/>
-            <a:tailEnd type="none" w="sm" len="sm"/>
-          </a:ln>
-        </p:spPr>
-        <p:txBody>
-          <a:bodyPr/>
-          <a:lstStyle/>
-          <a:p>
-            <a:endParaRPr lang="ja-JP" altLang="en-US">
-              <a:latin typeface="Yu Gothic" panose="020B0400000000000000" pitchFamily="34" charset="-128"/>
-              <a:ea typeface="Yu Gothic" panose="020B0400000000000000" pitchFamily="34" charset="-128"/>
-            </a:endParaRPr>
-          </a:p>
-        </p:txBody>
-      </p:sp>
-      <p:sp>
-        <p:nvSpPr>
-          <p:cNvPr id="4" name="AutoShape 4">
-            <a:extLst>
-              <a:ext uri="{FF2B5EF4-FFF2-40B4-BE49-F238E27FC236}">
-                <a16:creationId xmlns:a16="http://schemas.microsoft.com/office/drawing/2014/main" id="{238F061B-C69A-1D3F-F2BF-701304CADBB6}"/>
-              </a:ext>
-            </a:extLst>
-          </p:cNvPr>
-          <p:cNvSpPr/>
-          <p:nvPr/>
-        </p:nvSpPr>
-        <p:spPr>
-          <a:xfrm flipV="1">
-            <a:off x="856856" y="904405"/>
-            <a:ext cx="16574288" cy="0"/>
-          </a:xfrm>
-          <a:prstGeom prst="line">
-            <a:avLst/>
-          </a:prstGeom>
-          <a:ln w="57150" cap="flat">
-            <a:solidFill>
-              <a:srgbClr val="1B1B1B"/>
-            </a:solidFill>
-            <a:prstDash val="solid"/>
-            <a:headEnd type="none" w="sm" len="sm"/>
-            <a:tailEnd type="none" w="sm" len="sm"/>
-          </a:ln>
-        </p:spPr>
-        <p:txBody>
-          <a:bodyPr/>
-          <a:lstStyle/>
-          <a:p>
-            <a:endParaRPr lang="ja-JP" altLang="en-US">
-              <a:latin typeface="Yu Gothic" panose="020B0400000000000000" pitchFamily="34" charset="-128"/>
-              <a:ea typeface="Yu Gothic" panose="020B0400000000000000" pitchFamily="34" charset="-128"/>
-            </a:endParaRPr>
-          </a:p>
-        </p:txBody>
-      </p:sp>
-      <p:sp>
-        <p:nvSpPr>
-          <p:cNvPr id="5" name="AutoShape 5">
-            <a:extLst>
-              <a:ext uri="{FF2B5EF4-FFF2-40B4-BE49-F238E27FC236}">
-                <a16:creationId xmlns:a16="http://schemas.microsoft.com/office/drawing/2014/main" id="{AE93A3A6-5C30-A162-449D-B5531DE51C26}"/>
-              </a:ext>
-            </a:extLst>
-          </p:cNvPr>
-          <p:cNvSpPr/>
-          <p:nvPr/>
-        </p:nvSpPr>
-        <p:spPr>
-          <a:xfrm>
-            <a:off x="857250" y="9382595"/>
-            <a:ext cx="16573500" cy="0"/>
-          </a:xfrm>
-          <a:prstGeom prst="line">
-            <a:avLst/>
-          </a:prstGeom>
-          <a:ln w="57150" cap="flat">
-            <a:solidFill>
-              <a:srgbClr val="1B1B1B"/>
-            </a:solidFill>
-            <a:prstDash val="solid"/>
-            <a:headEnd type="none" w="sm" len="sm"/>
-            <a:tailEnd type="none" w="sm" len="sm"/>
-          </a:ln>
-        </p:spPr>
-        <p:txBody>
-          <a:bodyPr/>
-          <a:lstStyle/>
-          <a:p>
-            <a:endParaRPr lang="ja-JP" altLang="en-US">
-              <a:latin typeface="Yu Gothic" panose="020B0400000000000000" pitchFamily="34" charset="-128"/>
-              <a:ea typeface="Yu Gothic" panose="020B0400000000000000" pitchFamily="34" charset="-128"/>
-            </a:endParaRPr>
-          </a:p>
-        </p:txBody>
-      </p:sp>
-      <p:sp>
-        <p:nvSpPr>
-          <p:cNvPr id="6" name="AutoShape 6">
-            <a:extLst>
-              <a:ext uri="{FF2B5EF4-FFF2-40B4-BE49-F238E27FC236}">
-                <a16:creationId xmlns:a16="http://schemas.microsoft.com/office/drawing/2014/main" id="{62FB3F49-7888-6954-4EF1-F43D6EB60595}"/>
-              </a:ext>
-            </a:extLst>
-          </p:cNvPr>
-          <p:cNvSpPr/>
-          <p:nvPr/>
-        </p:nvSpPr>
-        <p:spPr>
-          <a:xfrm>
-            <a:off x="857250" y="9239250"/>
-            <a:ext cx="16573500" cy="0"/>
-          </a:xfrm>
-          <a:prstGeom prst="line">
-            <a:avLst/>
-          </a:prstGeom>
-          <a:ln w="19050" cap="flat">
-            <a:solidFill>
-              <a:srgbClr val="1B1B1B"/>
-            </a:solidFill>
-            <a:prstDash val="solid"/>
-            <a:headEnd type="none" w="sm" len="sm"/>
-            <a:tailEnd type="none" w="sm" len="sm"/>
-          </a:ln>
-        </p:spPr>
-        <p:txBody>
-          <a:bodyPr/>
-          <a:lstStyle/>
-          <a:p>
-            <a:endParaRPr lang="ja-JP" altLang="en-US">
-              <a:latin typeface="Yu Gothic" panose="020B0400000000000000" pitchFamily="34" charset="-128"/>
-              <a:ea typeface="Yu Gothic" panose="020B0400000000000000" pitchFamily="34" charset="-128"/>
-            </a:endParaRPr>
-          </a:p>
-        </p:txBody>
-      </p:sp>
-      <p:grpSp>
-        <p:nvGrpSpPr>
-          <p:cNvPr id="7" name="Group 7">
-            <a:extLst>
-              <a:ext uri="{FF2B5EF4-FFF2-40B4-BE49-F238E27FC236}">
-                <a16:creationId xmlns:a16="http://schemas.microsoft.com/office/drawing/2014/main" id="{15E2B92C-4DAD-EC22-A6DD-3A42E30B3A90}"/>
-              </a:ext>
-            </a:extLst>
-          </p:cNvPr>
-          <p:cNvGrpSpPr/>
-          <p:nvPr/>
-        </p:nvGrpSpPr>
-        <p:grpSpPr>
-          <a:xfrm>
-            <a:off x="1282599" y="650625"/>
-            <a:ext cx="1213487" cy="1720205"/>
-            <a:chOff x="0" y="0"/>
-            <a:chExt cx="319601" cy="453058"/>
-          </a:xfrm>
-        </p:grpSpPr>
-        <p:sp>
-          <p:nvSpPr>
-            <p:cNvPr id="8" name="Freeform 8">
-              <a:extLst>
-                <a:ext uri="{FF2B5EF4-FFF2-40B4-BE49-F238E27FC236}">
-                  <a16:creationId xmlns:a16="http://schemas.microsoft.com/office/drawing/2014/main" id="{41999DAA-71A0-FC2C-816B-4BCE629BA608}"/>
-                </a:ext>
-              </a:extLst>
-            </p:cNvPr>
-            <p:cNvSpPr/>
-            <p:nvPr/>
-          </p:nvSpPr>
-          <p:spPr>
-            <a:xfrm>
-              <a:off x="0" y="0"/>
-              <a:ext cx="319601" cy="453058"/>
-            </a:xfrm>
-            <a:custGeom>
-              <a:avLst/>
-              <a:gdLst/>
-              <a:ahLst/>
-              <a:cxnLst/>
-              <a:rect l="l" t="t" r="r" b="b"/>
-              <a:pathLst>
-                <a:path w="319601" h="453058">
-                  <a:moveTo>
-                    <a:pt x="0" y="0"/>
-                  </a:moveTo>
-                  <a:lnTo>
-                    <a:pt x="319601" y="0"/>
-                  </a:lnTo>
-                  <a:lnTo>
-                    <a:pt x="319601" y="453058"/>
-                  </a:lnTo>
-                  <a:lnTo>
-                    <a:pt x="0" y="453058"/>
-                  </a:lnTo>
-                  <a:close/>
-                </a:path>
-              </a:pathLst>
-            </a:custGeom>
-            <a:solidFill>
-              <a:srgbClr val="1B1B1B"/>
-            </a:solidFill>
-          </p:spPr>
-          <p:txBody>
-            <a:bodyPr/>
-            <a:lstStyle/>
-            <a:p>
-              <a:endParaRPr lang="ja-JP" altLang="en-US">
-                <a:latin typeface="Yu Gothic" panose="020B0400000000000000" pitchFamily="34" charset="-128"/>
-                <a:ea typeface="Yu Gothic" panose="020B0400000000000000" pitchFamily="34" charset="-128"/>
-              </a:endParaRPr>
-            </a:p>
-          </p:txBody>
-        </p:sp>
-        <p:sp>
-          <p:nvSpPr>
-            <p:cNvPr id="9" name="TextBox 9">
-              <a:extLst>
-                <a:ext uri="{FF2B5EF4-FFF2-40B4-BE49-F238E27FC236}">
-                  <a16:creationId xmlns:a16="http://schemas.microsoft.com/office/drawing/2014/main" id="{B3E55F59-B376-E70D-5CC7-39BE8EA5E96A}"/>
-                </a:ext>
-              </a:extLst>
-            </p:cNvPr>
-            <p:cNvSpPr txBox="1"/>
-            <p:nvPr/>
-          </p:nvSpPr>
-          <p:spPr>
-            <a:xfrm>
-              <a:off x="0" y="-47625"/>
-              <a:ext cx="319601" cy="500683"/>
-            </a:xfrm>
-            <a:prstGeom prst="rect">
-              <a:avLst/>
-            </a:prstGeom>
-          </p:spPr>
-          <p:txBody>
-            <a:bodyPr lIns="50800" tIns="50800" rIns="50800" bIns="50800" rtlCol="0" anchor="ctr"/>
-            <a:lstStyle/>
-            <a:p>
-              <a:pPr algn="ctr">
-                <a:lnSpc>
-                  <a:spcPts val="3359"/>
-                </a:lnSpc>
-              </a:pPr>
-              <a:endParaRPr>
-                <a:latin typeface="Yu Gothic" panose="020B0400000000000000" pitchFamily="34" charset="-128"/>
-                <a:ea typeface="Yu Gothic" panose="020B0400000000000000" pitchFamily="34" charset="-128"/>
-              </a:endParaRPr>
-            </a:p>
-          </p:txBody>
-        </p:sp>
-      </p:grpSp>
-      <p:sp>
-        <p:nvSpPr>
-          <p:cNvPr id="12" name="TextBox 12">
-            <a:extLst>
-              <a:ext uri="{FF2B5EF4-FFF2-40B4-BE49-F238E27FC236}">
-                <a16:creationId xmlns:a16="http://schemas.microsoft.com/office/drawing/2014/main" id="{A45B9969-583A-7B5C-2C0E-4E3CD6DE3651}"/>
-              </a:ext>
-            </a:extLst>
-          </p:cNvPr>
-          <p:cNvSpPr txBox="1"/>
-          <p:nvPr/>
-        </p:nvSpPr>
-        <p:spPr>
-          <a:xfrm>
-            <a:off x="2949343" y="1371153"/>
-            <a:ext cx="14309957" cy="596317"/>
-          </a:xfrm>
-          <a:prstGeom prst="rect">
-            <a:avLst/>
-          </a:prstGeom>
-        </p:spPr>
-        <p:txBody>
-          <a:bodyPr lIns="0" tIns="0" rIns="0" bIns="0" rtlCol="0" anchor="t">
-            <a:spAutoFit/>
-          </a:bodyPr>
-          <a:lstStyle/>
-          <a:p>
-            <a:pPr algn="l">
-              <a:lnSpc>
-                <a:spcPts val="4900"/>
-              </a:lnSpc>
-            </a:pPr>
-            <a:r>
-              <a:rPr lang="ja-JP" altLang="en-US" sz="3500" b="1" spc="175">
-                <a:solidFill>
-                  <a:srgbClr val="1B1B1B"/>
-                </a:solidFill>
-                <a:latin typeface="Yu Gothic" panose="020B0400000000000000" pitchFamily="34" charset="-128"/>
-                <a:ea typeface="Yu Gothic" panose="020B0400000000000000" pitchFamily="34" charset="-128"/>
-                <a:cs typeface="Noto Sans JP Heavy"/>
-                <a:sym typeface="Noto Sans JP Heavy"/>
-              </a:rPr>
-              <a:t>ユーザーアクション</a:t>
-            </a:r>
-            <a:r>
-              <a:rPr lang="en-US" altLang="ja-JP" sz="3500" b="1" spc="175" dirty="0">
-                <a:solidFill>
-                  <a:srgbClr val="1B1B1B"/>
-                </a:solidFill>
-                <a:latin typeface="Yu Gothic" panose="020B0400000000000000" pitchFamily="34" charset="-128"/>
-                <a:ea typeface="Yu Gothic" panose="020B0400000000000000" pitchFamily="34" charset="-128"/>
-                <a:cs typeface="Noto Sans JP Heavy"/>
-                <a:sym typeface="Noto Sans JP Heavy"/>
-              </a:rPr>
-              <a:t> – </a:t>
-            </a:r>
-            <a:r>
-              <a:rPr lang="ja-JP" altLang="en-US" sz="3500" b="1" spc="175">
-                <a:solidFill>
-                  <a:srgbClr val="1B1B1B"/>
-                </a:solidFill>
-                <a:latin typeface="Yu Gothic" panose="020B0400000000000000" pitchFamily="34" charset="-128"/>
-                <a:ea typeface="Yu Gothic" panose="020B0400000000000000" pitchFamily="34" charset="-128"/>
-                <a:cs typeface="Noto Sans JP Heavy"/>
-                <a:sym typeface="Noto Sans JP Heavy"/>
-              </a:rPr>
-              <a:t>録音</a:t>
-            </a:r>
-            <a:endParaRPr lang="en-US" sz="3500" b="1" spc="175" dirty="0">
-              <a:solidFill>
-                <a:srgbClr val="1B1B1B"/>
-              </a:solidFill>
-              <a:latin typeface="Yu Gothic" panose="020B0400000000000000" pitchFamily="34" charset="-128"/>
-              <a:ea typeface="Yu Gothic" panose="020B0400000000000000" pitchFamily="34" charset="-128"/>
-              <a:cs typeface="Noto Sans JP Heavy"/>
-              <a:sym typeface="Noto Sans JP Heavy"/>
-            </a:endParaRPr>
-          </a:p>
-        </p:txBody>
-      </p:sp>
-      <p:sp>
-        <p:nvSpPr>
-          <p:cNvPr id="13" name="TextBox 13">
-            <a:extLst>
-              <a:ext uri="{FF2B5EF4-FFF2-40B4-BE49-F238E27FC236}">
-                <a16:creationId xmlns:a16="http://schemas.microsoft.com/office/drawing/2014/main" id="{F6F1DA9D-8846-D312-1ECE-8AFDAD080582}"/>
-              </a:ext>
-            </a:extLst>
-          </p:cNvPr>
-          <p:cNvSpPr txBox="1"/>
-          <p:nvPr/>
-        </p:nvSpPr>
-        <p:spPr>
-          <a:xfrm>
-            <a:off x="1461953" y="1228278"/>
-            <a:ext cx="854779" cy="733425"/>
-          </a:xfrm>
-          <a:prstGeom prst="rect">
-            <a:avLst/>
-          </a:prstGeom>
-        </p:spPr>
-        <p:txBody>
-          <a:bodyPr lIns="0" tIns="0" rIns="0" bIns="0" rtlCol="0" anchor="t">
-            <a:spAutoFit/>
-          </a:bodyPr>
-          <a:lstStyle/>
-          <a:p>
-            <a:pPr marL="0" lvl="0" indent="0" algn="ctr">
-              <a:lnSpc>
-                <a:spcPts val="6300"/>
-              </a:lnSpc>
-              <a:spcBef>
-                <a:spcPct val="0"/>
-              </a:spcBef>
-            </a:pPr>
-            <a:r>
-              <a:rPr lang="en-US" sz="3500" b="1" u="none" strike="noStrike" dirty="0">
-                <a:solidFill>
-                  <a:srgbClr val="FAFAFA"/>
-                </a:solidFill>
-                <a:latin typeface="Yu Gothic" panose="020B0400000000000000" pitchFamily="34" charset="-128"/>
-                <a:ea typeface="Yu Gothic" panose="020B0400000000000000" pitchFamily="34" charset="-128"/>
-                <a:cs typeface="Open Sans Bold"/>
-                <a:sym typeface="Open Sans Bold"/>
-              </a:rPr>
-              <a:t>04</a:t>
-            </a:r>
-          </a:p>
-        </p:txBody>
-      </p:sp>
-      <p:sp>
-        <p:nvSpPr>
-          <p:cNvPr id="10" name="テキスト ボックス 9">
-            <a:extLst>
-              <a:ext uri="{FF2B5EF4-FFF2-40B4-BE49-F238E27FC236}">
-                <a16:creationId xmlns:a16="http://schemas.microsoft.com/office/drawing/2014/main" id="{F8DA5290-255B-FA72-C661-A63C5A3F8CC0}"/>
-              </a:ext>
-            </a:extLst>
-          </p:cNvPr>
-          <p:cNvSpPr txBox="1"/>
-          <p:nvPr/>
-        </p:nvSpPr>
-        <p:spPr>
-          <a:xfrm>
-            <a:off x="6698887" y="4931267"/>
-            <a:ext cx="3416320" cy="1015663"/>
-          </a:xfrm>
-          <a:prstGeom prst="rect">
-            <a:avLst/>
-          </a:prstGeom>
-          <a:noFill/>
-        </p:spPr>
-        <p:txBody>
-          <a:bodyPr wrap="none" rtlCol="0">
-            <a:spAutoFit/>
-          </a:bodyPr>
-          <a:lstStyle/>
-          <a:p>
-            <a:r>
-              <a:rPr kumimoji="1" lang="ja-JP" altLang="en-US" sz="6000">
-                <a:highlight>
-                  <a:srgbClr val="FFFF00"/>
-                </a:highlight>
-              </a:rPr>
-              <a:t>あとでかく</a:t>
-            </a:r>
-          </a:p>
-        </p:txBody>
-      </p:sp>
-    </p:spTree>
-    <p:extLst>
-      <p:ext uri="{BB962C8B-B14F-4D97-AF65-F5344CB8AC3E}">
-        <p14:creationId xmlns:p14="http://schemas.microsoft.com/office/powerpoint/2010/main" val="1476022028"/>
-      </p:ext>
-    </p:extLst>
-  </p:cSld>
-  <p:clrMapOvr>
-    <a:masterClrMapping/>
-  </p:clrMapOvr>
-</p:sld>
-</file>
-
-<file path=ppt/slides/slide8.xml><?xml version="1.0" encoding="utf-8"?>
-<p:sld xmlns:a="http://schemas.openxmlformats.org/drawingml/2006/main" xmlns:r="http://schemas.openxmlformats.org/officeDocument/2006/relationships" xmlns:p="http://schemas.openxmlformats.org/presentationml/2006/main">
-  <p:cSld>
-    <p:spTree>
-      <p:nvGrpSpPr>
-        <p:cNvPr id="1" name="">
-          <a:extLst>
-            <a:ext uri="{FF2B5EF4-FFF2-40B4-BE49-F238E27FC236}">
-              <a16:creationId xmlns:a16="http://schemas.microsoft.com/office/drawing/2014/main" id="{4A8648CB-8C07-088B-F856-7C552C642AC7}"/>
-            </a:ext>
-          </a:extLst>
-        </p:cNvPr>
-        <p:cNvGrpSpPr/>
-        <p:nvPr/>
-      </p:nvGrpSpPr>
-      <p:grpSpPr>
-        <a:xfrm>
-          <a:off x="0" y="0"/>
-          <a:ext cx="0" cy="0"/>
-          <a:chOff x="0" y="0"/>
-          <a:chExt cx="0" cy="0"/>
-        </a:xfrm>
-      </p:grpSpPr>
-      <p:sp>
-        <p:nvSpPr>
-          <p:cNvPr id="2" name="AutoShape 2">
-            <a:extLst>
-              <a:ext uri="{FF2B5EF4-FFF2-40B4-BE49-F238E27FC236}">
-                <a16:creationId xmlns:a16="http://schemas.microsoft.com/office/drawing/2014/main" id="{E1798DF8-A7D8-D37C-6BC4-6FC541F7E6B3}"/>
-              </a:ext>
-            </a:extLst>
-          </p:cNvPr>
-          <p:cNvSpPr/>
-          <p:nvPr/>
-        </p:nvSpPr>
-        <p:spPr>
-          <a:xfrm>
-            <a:off x="857250" y="2361305"/>
-            <a:ext cx="16573500" cy="0"/>
-          </a:xfrm>
-          <a:prstGeom prst="line">
-            <a:avLst/>
-          </a:prstGeom>
-          <a:ln w="19050" cap="flat">
-            <a:solidFill>
-              <a:srgbClr val="1B1B1B"/>
-            </a:solidFill>
-            <a:prstDash val="solid"/>
-            <a:headEnd type="none" w="sm" len="sm"/>
-            <a:tailEnd type="none" w="sm" len="sm"/>
-          </a:ln>
-        </p:spPr>
-        <p:txBody>
-          <a:bodyPr/>
-          <a:lstStyle/>
-          <a:p>
-            <a:endParaRPr lang="ja-JP" altLang="en-US">
-              <a:latin typeface="Yu Gothic" panose="020B0400000000000000" pitchFamily="34" charset="-128"/>
-              <a:ea typeface="Yu Gothic" panose="020B0400000000000000" pitchFamily="34" charset="-128"/>
-            </a:endParaRPr>
-          </a:p>
-        </p:txBody>
-      </p:sp>
-      <p:sp>
-        <p:nvSpPr>
-          <p:cNvPr id="3" name="AutoShape 3">
-            <a:extLst>
-              <a:ext uri="{FF2B5EF4-FFF2-40B4-BE49-F238E27FC236}">
-                <a16:creationId xmlns:a16="http://schemas.microsoft.com/office/drawing/2014/main" id="{BD09E11A-B2C5-B7F0-7CF5-D9BCBC7B4758}"/>
-              </a:ext>
-            </a:extLst>
-          </p:cNvPr>
-          <p:cNvSpPr/>
-          <p:nvPr/>
-        </p:nvSpPr>
-        <p:spPr>
-          <a:xfrm>
-            <a:off x="857250" y="1047750"/>
-            <a:ext cx="16573459" cy="0"/>
-          </a:xfrm>
-          <a:prstGeom prst="line">
-            <a:avLst/>
-          </a:prstGeom>
-          <a:ln w="19050" cap="flat">
-            <a:solidFill>
-              <a:srgbClr val="1B1B1B"/>
-            </a:solidFill>
-            <a:prstDash val="solid"/>
-            <a:headEnd type="none" w="sm" len="sm"/>
-            <a:tailEnd type="none" w="sm" len="sm"/>
-          </a:ln>
-        </p:spPr>
-        <p:txBody>
-          <a:bodyPr/>
-          <a:lstStyle/>
-          <a:p>
-            <a:endParaRPr lang="ja-JP" altLang="en-US">
-              <a:latin typeface="Yu Gothic" panose="020B0400000000000000" pitchFamily="34" charset="-128"/>
-              <a:ea typeface="Yu Gothic" panose="020B0400000000000000" pitchFamily="34" charset="-128"/>
-            </a:endParaRPr>
-          </a:p>
-        </p:txBody>
-      </p:sp>
-      <p:sp>
-        <p:nvSpPr>
-          <p:cNvPr id="4" name="AutoShape 4">
-            <a:extLst>
-              <a:ext uri="{FF2B5EF4-FFF2-40B4-BE49-F238E27FC236}">
-                <a16:creationId xmlns:a16="http://schemas.microsoft.com/office/drawing/2014/main" id="{E856B690-EEEF-B48A-B5A0-34E8CBC93F19}"/>
-              </a:ext>
-            </a:extLst>
-          </p:cNvPr>
-          <p:cNvSpPr/>
-          <p:nvPr/>
-        </p:nvSpPr>
-        <p:spPr>
-          <a:xfrm flipV="1">
-            <a:off x="856856" y="904405"/>
-            <a:ext cx="16574288" cy="0"/>
-          </a:xfrm>
-          <a:prstGeom prst="line">
-            <a:avLst/>
-          </a:prstGeom>
-          <a:ln w="57150" cap="flat">
-            <a:solidFill>
-              <a:srgbClr val="1B1B1B"/>
-            </a:solidFill>
-            <a:prstDash val="solid"/>
-            <a:headEnd type="none" w="sm" len="sm"/>
-            <a:tailEnd type="none" w="sm" len="sm"/>
-          </a:ln>
-        </p:spPr>
-        <p:txBody>
-          <a:bodyPr/>
-          <a:lstStyle/>
-          <a:p>
-            <a:endParaRPr lang="ja-JP" altLang="en-US">
-              <a:latin typeface="Yu Gothic" panose="020B0400000000000000" pitchFamily="34" charset="-128"/>
-              <a:ea typeface="Yu Gothic" panose="020B0400000000000000" pitchFamily="34" charset="-128"/>
-            </a:endParaRPr>
-          </a:p>
-        </p:txBody>
-      </p:sp>
-      <p:sp>
-        <p:nvSpPr>
-          <p:cNvPr id="5" name="AutoShape 5">
-            <a:extLst>
-              <a:ext uri="{FF2B5EF4-FFF2-40B4-BE49-F238E27FC236}">
-                <a16:creationId xmlns:a16="http://schemas.microsoft.com/office/drawing/2014/main" id="{DD06C8D9-B1BC-0926-D7B3-682389007FB2}"/>
-              </a:ext>
-            </a:extLst>
-          </p:cNvPr>
-          <p:cNvSpPr/>
-          <p:nvPr/>
-        </p:nvSpPr>
-        <p:spPr>
-          <a:xfrm>
-            <a:off x="857250" y="9382595"/>
-            <a:ext cx="16573500" cy="0"/>
-          </a:xfrm>
-          <a:prstGeom prst="line">
-            <a:avLst/>
-          </a:prstGeom>
-          <a:ln w="57150" cap="flat">
-            <a:solidFill>
-              <a:srgbClr val="1B1B1B"/>
-            </a:solidFill>
-            <a:prstDash val="solid"/>
-            <a:headEnd type="none" w="sm" len="sm"/>
-            <a:tailEnd type="none" w="sm" len="sm"/>
-          </a:ln>
-        </p:spPr>
-        <p:txBody>
-          <a:bodyPr/>
-          <a:lstStyle/>
-          <a:p>
-            <a:endParaRPr lang="ja-JP" altLang="en-US">
-              <a:latin typeface="Yu Gothic" panose="020B0400000000000000" pitchFamily="34" charset="-128"/>
-              <a:ea typeface="Yu Gothic" panose="020B0400000000000000" pitchFamily="34" charset="-128"/>
-            </a:endParaRPr>
-          </a:p>
-        </p:txBody>
-      </p:sp>
-      <p:sp>
-        <p:nvSpPr>
-          <p:cNvPr id="6" name="AutoShape 6">
-            <a:extLst>
-              <a:ext uri="{FF2B5EF4-FFF2-40B4-BE49-F238E27FC236}">
-                <a16:creationId xmlns:a16="http://schemas.microsoft.com/office/drawing/2014/main" id="{338BD1D2-FB05-CC02-B8FC-7F69ECA0FD79}"/>
-              </a:ext>
-            </a:extLst>
-          </p:cNvPr>
-          <p:cNvSpPr/>
-          <p:nvPr/>
-        </p:nvSpPr>
-        <p:spPr>
-          <a:xfrm>
-            <a:off x="857250" y="9239250"/>
-            <a:ext cx="16573500" cy="0"/>
-          </a:xfrm>
-          <a:prstGeom prst="line">
-            <a:avLst/>
-          </a:prstGeom>
-          <a:ln w="19050" cap="flat">
-            <a:solidFill>
-              <a:srgbClr val="1B1B1B"/>
-            </a:solidFill>
-            <a:prstDash val="solid"/>
-            <a:headEnd type="none" w="sm" len="sm"/>
-            <a:tailEnd type="none" w="sm" len="sm"/>
-          </a:ln>
-        </p:spPr>
-        <p:txBody>
-          <a:bodyPr/>
-          <a:lstStyle/>
-          <a:p>
-            <a:endParaRPr lang="ja-JP" altLang="en-US">
-              <a:latin typeface="Yu Gothic" panose="020B0400000000000000" pitchFamily="34" charset="-128"/>
-              <a:ea typeface="Yu Gothic" panose="020B0400000000000000" pitchFamily="34" charset="-128"/>
-            </a:endParaRPr>
-          </a:p>
-        </p:txBody>
-      </p:sp>
-      <p:grpSp>
-        <p:nvGrpSpPr>
-          <p:cNvPr id="7" name="Group 7">
-            <a:extLst>
-              <a:ext uri="{FF2B5EF4-FFF2-40B4-BE49-F238E27FC236}">
-                <a16:creationId xmlns:a16="http://schemas.microsoft.com/office/drawing/2014/main" id="{B6D54C10-4133-CE15-0D6B-48DF3A199B18}"/>
-              </a:ext>
-            </a:extLst>
-          </p:cNvPr>
-          <p:cNvGrpSpPr/>
-          <p:nvPr/>
-        </p:nvGrpSpPr>
-        <p:grpSpPr>
-          <a:xfrm>
-            <a:off x="1282599" y="650625"/>
-            <a:ext cx="1213487" cy="1720205"/>
-            <a:chOff x="0" y="0"/>
-            <a:chExt cx="319601" cy="453058"/>
-          </a:xfrm>
-        </p:grpSpPr>
-        <p:sp>
-          <p:nvSpPr>
-            <p:cNvPr id="8" name="Freeform 8">
-              <a:extLst>
-                <a:ext uri="{FF2B5EF4-FFF2-40B4-BE49-F238E27FC236}">
-                  <a16:creationId xmlns:a16="http://schemas.microsoft.com/office/drawing/2014/main" id="{52C59789-4807-9FF0-89D3-0C1ADD1E2830}"/>
-                </a:ext>
-              </a:extLst>
-            </p:cNvPr>
-            <p:cNvSpPr/>
-            <p:nvPr/>
-          </p:nvSpPr>
-          <p:spPr>
-            <a:xfrm>
-              <a:off x="0" y="0"/>
-              <a:ext cx="319601" cy="453058"/>
-            </a:xfrm>
-            <a:custGeom>
-              <a:avLst/>
-              <a:gdLst/>
-              <a:ahLst/>
-              <a:cxnLst/>
-              <a:rect l="l" t="t" r="r" b="b"/>
-              <a:pathLst>
-                <a:path w="319601" h="453058">
-                  <a:moveTo>
-                    <a:pt x="0" y="0"/>
-                  </a:moveTo>
-                  <a:lnTo>
-                    <a:pt x="319601" y="0"/>
-                  </a:lnTo>
-                  <a:lnTo>
-                    <a:pt x="319601" y="453058"/>
-                  </a:lnTo>
-                  <a:lnTo>
-                    <a:pt x="0" y="453058"/>
-                  </a:lnTo>
-                  <a:close/>
-                </a:path>
-              </a:pathLst>
-            </a:custGeom>
-            <a:solidFill>
-              <a:srgbClr val="1B1B1B"/>
-            </a:solidFill>
-          </p:spPr>
-          <p:txBody>
-            <a:bodyPr/>
-            <a:lstStyle/>
-            <a:p>
-              <a:endParaRPr lang="ja-JP" altLang="en-US">
-                <a:latin typeface="Yu Gothic" panose="020B0400000000000000" pitchFamily="34" charset="-128"/>
-                <a:ea typeface="Yu Gothic" panose="020B0400000000000000" pitchFamily="34" charset="-128"/>
-              </a:endParaRPr>
-            </a:p>
-          </p:txBody>
-        </p:sp>
-        <p:sp>
-          <p:nvSpPr>
-            <p:cNvPr id="9" name="TextBox 9">
-              <a:extLst>
-                <a:ext uri="{FF2B5EF4-FFF2-40B4-BE49-F238E27FC236}">
-                  <a16:creationId xmlns:a16="http://schemas.microsoft.com/office/drawing/2014/main" id="{95775310-D832-2E09-24CD-6AEB005C885A}"/>
-                </a:ext>
-              </a:extLst>
-            </p:cNvPr>
-            <p:cNvSpPr txBox="1"/>
-            <p:nvPr/>
-          </p:nvSpPr>
-          <p:spPr>
-            <a:xfrm>
-              <a:off x="0" y="-47625"/>
-              <a:ext cx="319601" cy="500683"/>
-            </a:xfrm>
-            <a:prstGeom prst="rect">
-              <a:avLst/>
-            </a:prstGeom>
-          </p:spPr>
-          <p:txBody>
-            <a:bodyPr lIns="50800" tIns="50800" rIns="50800" bIns="50800" rtlCol="0" anchor="ctr"/>
-            <a:lstStyle/>
-            <a:p>
-              <a:pPr algn="ctr">
-                <a:lnSpc>
-                  <a:spcPts val="3359"/>
-                </a:lnSpc>
-              </a:pPr>
-              <a:endParaRPr>
-                <a:latin typeface="Yu Gothic" panose="020B0400000000000000" pitchFamily="34" charset="-128"/>
-                <a:ea typeface="Yu Gothic" panose="020B0400000000000000" pitchFamily="34" charset="-128"/>
-              </a:endParaRPr>
-            </a:p>
-          </p:txBody>
-        </p:sp>
-      </p:grpSp>
-      <p:sp>
-        <p:nvSpPr>
-          <p:cNvPr id="12" name="TextBox 12">
-            <a:extLst>
-              <a:ext uri="{FF2B5EF4-FFF2-40B4-BE49-F238E27FC236}">
-                <a16:creationId xmlns:a16="http://schemas.microsoft.com/office/drawing/2014/main" id="{6A4C04EF-4C53-AAE8-C4BE-8AB35F619B14}"/>
-              </a:ext>
-            </a:extLst>
-          </p:cNvPr>
-          <p:cNvSpPr txBox="1"/>
-          <p:nvPr/>
-        </p:nvSpPr>
-        <p:spPr>
-          <a:xfrm>
-            <a:off x="2949343" y="1371153"/>
-            <a:ext cx="14309957" cy="596317"/>
-          </a:xfrm>
-          <a:prstGeom prst="rect">
-            <a:avLst/>
-          </a:prstGeom>
-        </p:spPr>
-        <p:txBody>
-          <a:bodyPr lIns="0" tIns="0" rIns="0" bIns="0" rtlCol="0" anchor="t">
-            <a:spAutoFit/>
-          </a:bodyPr>
-          <a:lstStyle/>
-          <a:p>
-            <a:pPr algn="l">
-              <a:lnSpc>
-                <a:spcPts val="4900"/>
-              </a:lnSpc>
-            </a:pPr>
-            <a:r>
-              <a:rPr lang="ja-JP" altLang="en-US" sz="3500" b="1" spc="175">
-                <a:solidFill>
-                  <a:srgbClr val="1B1B1B"/>
-                </a:solidFill>
-                <a:latin typeface="Yu Gothic" panose="020B0400000000000000" pitchFamily="34" charset="-128"/>
-                <a:ea typeface="Yu Gothic" panose="020B0400000000000000" pitchFamily="34" charset="-128"/>
-                <a:cs typeface="Noto Sans JP Heavy"/>
-                <a:sym typeface="Noto Sans JP Heavy"/>
-              </a:rPr>
-              <a:t>ユーザーアクション</a:t>
-            </a:r>
-            <a:r>
-              <a:rPr lang="en-US" altLang="ja-JP" sz="3500" b="1" spc="175" dirty="0">
-                <a:solidFill>
-                  <a:srgbClr val="1B1B1B"/>
-                </a:solidFill>
-                <a:latin typeface="Yu Gothic" panose="020B0400000000000000" pitchFamily="34" charset="-128"/>
-                <a:ea typeface="Yu Gothic" panose="020B0400000000000000" pitchFamily="34" charset="-128"/>
-                <a:cs typeface="Noto Sans JP Heavy"/>
-                <a:sym typeface="Noto Sans JP Heavy"/>
-              </a:rPr>
-              <a:t> – </a:t>
-            </a:r>
-            <a:r>
-              <a:rPr lang="ja-JP" altLang="en-US" sz="3500" b="1" spc="175">
-                <a:solidFill>
-                  <a:srgbClr val="1B1B1B"/>
-                </a:solidFill>
-                <a:latin typeface="Yu Gothic" panose="020B0400000000000000" pitchFamily="34" charset="-128"/>
-                <a:ea typeface="Yu Gothic" panose="020B0400000000000000" pitchFamily="34" charset="-128"/>
-                <a:cs typeface="Noto Sans JP Heavy"/>
-                <a:sym typeface="Noto Sans JP Heavy"/>
-              </a:rPr>
-              <a:t>マッチング</a:t>
-            </a:r>
-            <a:endParaRPr lang="en-US" sz="3500" b="1" spc="175" dirty="0">
-              <a:solidFill>
-                <a:srgbClr val="1B1B1B"/>
-              </a:solidFill>
-              <a:latin typeface="Yu Gothic" panose="020B0400000000000000" pitchFamily="34" charset="-128"/>
-              <a:ea typeface="Yu Gothic" panose="020B0400000000000000" pitchFamily="34" charset="-128"/>
-              <a:cs typeface="Noto Sans JP Heavy"/>
-              <a:sym typeface="Noto Sans JP Heavy"/>
-            </a:endParaRPr>
-          </a:p>
-        </p:txBody>
-      </p:sp>
-      <p:sp>
-        <p:nvSpPr>
-          <p:cNvPr id="13" name="TextBox 13">
-            <a:extLst>
-              <a:ext uri="{FF2B5EF4-FFF2-40B4-BE49-F238E27FC236}">
-                <a16:creationId xmlns:a16="http://schemas.microsoft.com/office/drawing/2014/main" id="{F5D53381-3C5C-441A-E0DF-0277C4974B01}"/>
-              </a:ext>
-            </a:extLst>
-          </p:cNvPr>
-          <p:cNvSpPr txBox="1"/>
-          <p:nvPr/>
-        </p:nvSpPr>
-        <p:spPr>
-          <a:xfrm>
-            <a:off x="1461953" y="1228278"/>
-            <a:ext cx="854779" cy="733425"/>
-          </a:xfrm>
-          <a:prstGeom prst="rect">
-            <a:avLst/>
-          </a:prstGeom>
-        </p:spPr>
-        <p:txBody>
-          <a:bodyPr lIns="0" tIns="0" rIns="0" bIns="0" rtlCol="0" anchor="t">
-            <a:spAutoFit/>
-          </a:bodyPr>
-          <a:lstStyle/>
-          <a:p>
-            <a:pPr marL="0" lvl="0" indent="0" algn="ctr">
-              <a:lnSpc>
-                <a:spcPts val="6300"/>
-              </a:lnSpc>
-              <a:spcBef>
-                <a:spcPct val="0"/>
-              </a:spcBef>
-            </a:pPr>
-            <a:r>
-              <a:rPr lang="en-US" sz="3500" b="1" u="none" strike="noStrike" dirty="0">
-                <a:solidFill>
-                  <a:srgbClr val="FAFAFA"/>
-                </a:solidFill>
-                <a:latin typeface="Yu Gothic" panose="020B0400000000000000" pitchFamily="34" charset="-128"/>
-                <a:ea typeface="Yu Gothic" panose="020B0400000000000000" pitchFamily="34" charset="-128"/>
-                <a:cs typeface="Open Sans Bold"/>
-                <a:sym typeface="Open Sans Bold"/>
-              </a:rPr>
-              <a:t>04</a:t>
-            </a:r>
-          </a:p>
-        </p:txBody>
-      </p:sp>
-      <p:sp>
-        <p:nvSpPr>
-          <p:cNvPr id="10" name="テキスト ボックス 9">
-            <a:extLst>
-              <a:ext uri="{FF2B5EF4-FFF2-40B4-BE49-F238E27FC236}">
-                <a16:creationId xmlns:a16="http://schemas.microsoft.com/office/drawing/2014/main" id="{F41F76B9-2DD7-C940-7C40-75CA5C27DF7E}"/>
-              </a:ext>
-            </a:extLst>
-          </p:cNvPr>
-          <p:cNvSpPr txBox="1"/>
-          <p:nvPr/>
-        </p:nvSpPr>
-        <p:spPr>
-          <a:xfrm>
-            <a:off x="6698887" y="4931267"/>
-            <a:ext cx="3416320" cy="1015663"/>
-          </a:xfrm>
-          <a:prstGeom prst="rect">
-            <a:avLst/>
-          </a:prstGeom>
-          <a:noFill/>
-        </p:spPr>
-        <p:txBody>
-          <a:bodyPr wrap="none" rtlCol="0">
-            <a:spAutoFit/>
-          </a:bodyPr>
-          <a:lstStyle/>
-          <a:p>
-            <a:r>
-              <a:rPr kumimoji="1" lang="ja-JP" altLang="en-US" sz="6000">
-                <a:highlight>
-                  <a:srgbClr val="FFFF00"/>
-                </a:highlight>
-              </a:rPr>
-              <a:t>あとでかく</a:t>
-            </a:r>
-          </a:p>
-        </p:txBody>
-      </p:sp>
-    </p:spTree>
-    <p:extLst>
-      <p:ext uri="{BB962C8B-B14F-4D97-AF65-F5344CB8AC3E}">
-        <p14:creationId xmlns:p14="http://schemas.microsoft.com/office/powerpoint/2010/main" val="2574859237"/>
-      </p:ext>
-    </p:extLst>
-  </p:cSld>
-  <p:clrMapOvr>
-    <a:masterClrMapping/>
-  </p:clrMapOvr>
-</p:sld>
-</file>
-
 <file path=ppt/theme/theme1.xml><?xml version="1.0" encoding="utf-8"?>
 <a:theme xmlns:a="http://schemas.openxmlformats.org/drawingml/2006/main" name="Office Theme">
   <a:themeElements>

</xml_diff>